<commit_message>
Update slides for IWBDA 2021
</commit_message>
<xml_diff>
--- a/2021/IWBDA21/pySBOL3-IWBDA-2021.pptx
+++ b/2021/IWBDA21/pySBOL3-IWBDA-2021.pptx
@@ -148,7 +148,28 @@
 <file path=ppt/commentAuthors.xml><?xml version="1.0" encoding="utf-8"?>
 <p:cmAuthorLst xmlns:a="http://schemas.openxmlformats.org/drawingml/2006/main" xmlns:r="http://schemas.openxmlformats.org/officeDocument/2006/relationships" xmlns:p="http://schemas.openxmlformats.org/presentationml/2006/main">
   <p:cmAuthor id="1" name="Amy Avitabile" initials="AA" lastIdx="1" clrIdx="0"/>
+  <p:cmAuthor id="2" name="Tom Mitchell" initials="TM" lastIdx="1" clrIdx="1">
+    <p:extLst>
+      <p:ext uri="{19B8F6BF-5375-455C-9EA6-DF929625EA0E}">
+        <p15:presenceInfo xmlns:p15="http://schemas.microsoft.com/office/powerpoint/2012/main" userId="Tom Mitchell" providerId="None"/>
+      </p:ext>
+    </p:extLst>
+  </p:cmAuthor>
 </p:cmAuthorLst>
+</file>
+
+<file path=ppt/comments/comment1.xml><?xml version="1.0" encoding="utf-8"?>
+<p:cmLst xmlns:a="http://schemas.openxmlformats.org/drawingml/2006/main" xmlns:r="http://schemas.openxmlformats.org/officeDocument/2006/relationships" xmlns:p="http://schemas.openxmlformats.org/presentationml/2006/main">
+  <p:cm authorId="2" dt="2021-09-09T14:31:09.461" idx="1">
+    <p:pos x="10" y="10"/>
+    <p:text/>
+    <p:extLst>
+      <p:ext uri="{C676402C-5697-4E1C-873F-D02D1690AC5C}">
+        <p15:threadingInfo xmlns:p15="http://schemas.microsoft.com/office/powerpoint/2012/main" timeZoneBias="240"/>
+      </p:ext>
+    </p:extLst>
+  </p:cm>
+</p:cmLst>
 </file>
 
 <file path=ppt/handoutMasters/handoutMaster1.xml><?xml version="1.0" encoding="utf-8"?>
@@ -9282,14 +9303,14 @@
           </a:ln>
           <a:extLst>
             <a:ext uri="{909E8E84-426E-40dd-AFC4-6F175D3DCCD1}">
-              <a14:hiddenFill xmlns:a14="http://schemas.microsoft.com/office/drawing/2010/main" xmlns="">
+              <a14:hiddenFill xmlns="" xmlns:a14="http://schemas.microsoft.com/office/drawing/2010/main">
                 <a:solidFill>
                   <a:srgbClr val="FFFFFF"/>
                 </a:solidFill>
               </a14:hiddenFill>
             </a:ext>
             <a:ext uri="{91240B29-F687-4f45-9708-019B960494DF}">
-              <a14:hiddenLine xmlns:a14="http://schemas.microsoft.com/office/drawing/2010/main" xmlns="" w="9525">
+              <a14:hiddenLine xmlns="" xmlns:a14="http://schemas.microsoft.com/office/drawing/2010/main" w="9525">
                 <a:solidFill>
                   <a:srgbClr val="000000"/>
                 </a:solidFill>
@@ -9547,14 +9568,14 @@
           </a:ln>
           <a:extLst>
             <a:ext uri="{909E8E84-426E-40dd-AFC4-6F175D3DCCD1}">
-              <a14:hiddenFill xmlns:a14="http://schemas.microsoft.com/office/drawing/2010/main" xmlns="">
+              <a14:hiddenFill xmlns="" xmlns:a14="http://schemas.microsoft.com/office/drawing/2010/main">
                 <a:solidFill>
                   <a:srgbClr val="FFFFFF"/>
                 </a:solidFill>
               </a14:hiddenFill>
             </a:ext>
             <a:ext uri="{91240B29-F687-4f45-9708-019B960494DF}">
-              <a14:hiddenLine xmlns:a14="http://schemas.microsoft.com/office/drawing/2010/main" xmlns="" w="9525">
+              <a14:hiddenLine xmlns="" xmlns:a14="http://schemas.microsoft.com/office/drawing/2010/main" w="9525">
                 <a:solidFill>
                   <a:srgbClr val="000000"/>
                 </a:solidFill>
@@ -12050,7 +12071,7 @@
           <a:p>
             <a:r>
               <a:rPr lang="en-US" dirty="0"/>
-              <a:t>October, 2020</a:t>
+              <a:t>September, 2021</a:t>
             </a:r>
           </a:p>
         </p:txBody>
@@ -12072,7 +12093,7 @@
           <a:p>
             <a:r>
               <a:rPr lang="en-US" dirty="0"/>
-              <a:t>For COMBINE 2020</a:t>
+              <a:t>For IWBDA 2021</a:t>
             </a:r>
           </a:p>
         </p:txBody>
@@ -12207,7 +12228,7 @@
           <a:p>
             <a:r>
               <a:rPr lang="en-US" dirty="0"/>
-              <a:t>Early alpha release is available now</a:t>
+              <a:t>Beta release is available now</a:t>
             </a:r>
           </a:p>
           <a:p>
@@ -12223,7 +12244,7 @@
             <a:pPr lvl="1"/>
             <a:r>
               <a:rPr lang="en-US" dirty="0"/>
-              <a:t>Open issues to report bugs and request features</a:t>
+              <a:t>Use issues to report bugs and request features</a:t>
             </a:r>
           </a:p>
           <a:p>
@@ -12534,8 +12555,8 @@
         </p:nvSpPr>
         <p:spPr>
           <a:xfrm>
-            <a:off x="2833985" y="3838826"/>
-            <a:ext cx="6524030" cy="1754326"/>
+            <a:off x="2276140" y="3838826"/>
+            <a:ext cx="7639720" cy="1754326"/>
           </a:xfrm>
           <a:prstGeom prst="rect">
             <a:avLst/>
@@ -12576,21 +12597,21 @@
             <a:pPr algn="ctr"/>
             <a:r>
               <a:rPr lang="en-US" dirty="0"/>
-              <a:t>SBOL Version 3: Simplified Data Exchange for Bioengineering</a:t>
+              <a:t>SBOL Version 3: Data Exchange throughout the Bioengineering Lifecycle</a:t>
             </a:r>
           </a:p>
           <a:p>
             <a:pPr algn="ctr"/>
             <a:r>
               <a:rPr lang="en-US" dirty="0"/>
-              <a:t>Wednesday, October 7</a:t>
+              <a:t>Monday, September 20</a:t>
             </a:r>
           </a:p>
           <a:p>
             <a:pPr algn="ctr"/>
             <a:r>
               <a:rPr lang="en-US" dirty="0"/>
-              <a:t>18:00 - 21:00 UTC</a:t>
+              <a:t>17:30 - 15:30 UTC</a:t>
             </a:r>
           </a:p>
           <a:p>
@@ -13759,6 +13780,64 @@
             <a:r>
               <a:rPr lang="en-US" dirty="0"/>
               <a:t>pySBOL3 Implements SBOL 3.0</a:t>
+            </a:r>
+          </a:p>
+        </p:txBody>
+      </p:sp>
+      <p:sp>
+        <p:nvSpPr>
+          <p:cNvPr id="3" name="Line Callout 1 2">
+            <a:extLst>
+              <a:ext uri="{FF2B5EF4-FFF2-40B4-BE49-F238E27FC236}">
+                <a16:creationId xmlns:a16="http://schemas.microsoft.com/office/drawing/2014/main" id="{F3F965B1-8D53-E64B-866E-DBB10F310529}"/>
+              </a:ext>
+            </a:extLst>
+          </p:cNvPr>
+          <p:cNvSpPr/>
+          <p:nvPr/>
+        </p:nvSpPr>
+        <p:spPr>
+          <a:xfrm>
+            <a:off x="8199557" y="2685252"/>
+            <a:ext cx="2783840" cy="1993427"/>
+          </a:xfrm>
+          <a:prstGeom prst="borderCallout1">
+            <a:avLst/>
+          </a:prstGeom>
+        </p:spPr>
+        <p:style>
+          <a:lnRef idx="1">
+            <a:schemeClr val="accent4"/>
+          </a:lnRef>
+          <a:fillRef idx="2">
+            <a:schemeClr val="accent4"/>
+          </a:fillRef>
+          <a:effectRef idx="1">
+            <a:schemeClr val="accent4"/>
+          </a:effectRef>
+          <a:fontRef idx="minor">
+            <a:schemeClr val="dk1"/>
+          </a:fontRef>
+        </p:style>
+        <p:txBody>
+          <a:bodyPr rtlCol="0" anchor="ctr"/>
+          <a:lstStyle/>
+          <a:p>
+            <a:pPr algn="ctr"/>
+            <a:r>
+              <a:rPr lang="en-US" dirty="0"/>
+              <a:t>What should we say about SBOL 3.0.1?</a:t>
+            </a:r>
+          </a:p>
+          <a:p>
+            <a:pPr algn="ctr"/>
+            <a:endParaRPr lang="en-US" dirty="0"/>
+          </a:p>
+          <a:p>
+            <a:pPr algn="ctr"/>
+            <a:r>
+              <a:rPr lang="en-US" dirty="0"/>
+              <a:t>Are there other SBOL specification sessions at IWBDA?</a:t>
             </a:r>
           </a:p>
         </p:txBody>
@@ -16838,13 +16917,13 @@
   <p:clrMapOvr>
     <a:masterClrMapping/>
   </p:clrMapOvr>
-  <mc:AlternateContent xmlns:mc="http://schemas.openxmlformats.org/markup-compatibility/2006">
-    <mc:Choice xmlns:p14="http://schemas.microsoft.com/office/powerpoint/2010/main" Requires="p14">
+  <mc:AlternateContent xmlns:mc="http://schemas.openxmlformats.org/markup-compatibility/2006" xmlns:p14="http://schemas.microsoft.com/office/powerpoint/2010/main">
+    <mc:Choice Requires="p14">
       <p:transition spd="med" p14:dur="700">
         <p:fade/>
       </p:transition>
     </mc:Choice>
-    <mc:Fallback>
+    <mc:Fallback xmlns="">
       <p:transition spd="med">
         <p:fade/>
       </p:transition>
@@ -18742,19 +18821,19 @@
 </file>
 
 <file path=customXml/itemProps1.xml><?xml version="1.0" encoding="utf-8"?>
+<ds:datastoreItem xmlns:ds="http://schemas.openxmlformats.org/officeDocument/2006/customXml" ds:itemID="{26C53044-EDCC-4767-9B64-ABCDF4BF539A}">
+  <ds:schemaRefs>
+    <ds:schemaRef ds:uri="http://www.w3.org/2001/XMLSchema"/>
+    <ds:schemaRef ds:uri="http://www.boldonjames.com/2016/02/Classifier/internal/wrappedLabelHistory"/>
+  </ds:schemaRefs>
+</ds:datastoreItem>
+</file>
+
+<file path=customXml/itemProps2.xml><?xml version="1.0" encoding="utf-8"?>
 <ds:datastoreItem xmlns:ds="http://schemas.openxmlformats.org/officeDocument/2006/customXml" ds:itemID="{D88A9972-54D5-4A46-9260-9FE1CB78EDF2}">
   <ds:schemaRefs>
     <ds:schemaRef ds:uri="http://www.w3.org/2001/XMLSchema"/>
     <ds:schemaRef ds:uri="http://www.boldonjames.com/2008/01/sie/internal/label"/>
   </ds:schemaRefs>
 </ds:datastoreItem>
-</file>
-
-<file path=customXml/itemProps2.xml><?xml version="1.0" encoding="utf-8"?>
-<ds:datastoreItem xmlns:ds="http://schemas.openxmlformats.org/officeDocument/2006/customXml" ds:itemID="{26C53044-EDCC-4767-9B64-ABCDF4BF539A}">
-  <ds:schemaRefs>
-    <ds:schemaRef ds:uri="http://www.w3.org/2001/XMLSchema"/>
-    <ds:schemaRef ds:uri="http://www.boldonjames.com/2016/02/Classifier/internal/wrappedLabelHistory"/>
-  </ds:schemaRefs>
-</ds:datastoreItem>
 </file>
</xml_diff>

<commit_message>
Updated materials for 3.0.1 + tyto
</commit_message>
<xml_diff>
--- a/2021/IWBDA21/pySBOL3-IWBDA-2021.pptx
+++ b/2021/IWBDA21/pySBOL3-IWBDA-2021.pptx
@@ -9303,14 +9303,14 @@
           </a:ln>
           <a:extLst>
             <a:ext uri="{909E8E84-426E-40dd-AFC4-6F175D3DCCD1}">
-              <a14:hiddenFill xmlns="" xmlns:a14="http://schemas.microsoft.com/office/drawing/2010/main">
+              <a14:hiddenFill xmlns:a14="http://schemas.microsoft.com/office/drawing/2010/main" xmlns="">
                 <a:solidFill>
                   <a:srgbClr val="FFFFFF"/>
                 </a:solidFill>
               </a14:hiddenFill>
             </a:ext>
             <a:ext uri="{91240B29-F687-4f45-9708-019B960494DF}">
-              <a14:hiddenLine xmlns="" xmlns:a14="http://schemas.microsoft.com/office/drawing/2010/main" w="9525">
+              <a14:hiddenLine xmlns:a14="http://schemas.microsoft.com/office/drawing/2010/main" xmlns="" w="9525">
                 <a:solidFill>
                   <a:srgbClr val="000000"/>
                 </a:solidFill>
@@ -9568,14 +9568,14 @@
           </a:ln>
           <a:extLst>
             <a:ext uri="{909E8E84-426E-40dd-AFC4-6F175D3DCCD1}">
-              <a14:hiddenFill xmlns="" xmlns:a14="http://schemas.microsoft.com/office/drawing/2010/main">
+              <a14:hiddenFill xmlns:a14="http://schemas.microsoft.com/office/drawing/2010/main" xmlns="">
                 <a:solidFill>
                   <a:srgbClr val="FFFFFF"/>
                 </a:solidFill>
               </a14:hiddenFill>
             </a:ext>
             <a:ext uri="{91240B29-F687-4f45-9708-019B960494DF}">
-              <a14:hiddenLine xmlns="" xmlns:a14="http://schemas.microsoft.com/office/drawing/2010/main" w="9525">
+              <a14:hiddenLine xmlns:a14="http://schemas.microsoft.com/office/drawing/2010/main" xmlns="" w="9525">
                 <a:solidFill>
                   <a:srgbClr val="000000"/>
                 </a:solidFill>
@@ -13672,40 +13672,10 @@
             </a:r>
           </a:p>
           <a:p>
-            <a:endParaRPr lang="en-US" dirty="0"/>
-          </a:p>
-          <a:p>
+            <a:pPr lvl="1"/>
             <a:r>
               <a:rPr lang="en-US" dirty="0"/>
-              <a:t>SBOL 3.0.1 is expected very soon</a:t>
-            </a:r>
-          </a:p>
-          <a:p>
-            <a:pPr lvl="1"/>
-            <a:r>
-              <a:rPr lang="en-US" dirty="0"/>
-              <a:t>Discussions are happening at COMBINE 2020</a:t>
-            </a:r>
-          </a:p>
-          <a:p>
-            <a:pPr lvl="2"/>
-            <a:r>
-              <a:rPr lang="en-US" dirty="0"/>
-              <a:t>Taking place Wednesday, Thursday, and Friday</a:t>
-            </a:r>
-          </a:p>
-          <a:p>
-            <a:pPr lvl="2"/>
-            <a:r>
-              <a:rPr lang="en-US" dirty="0"/>
-              <a:t>Look for breakout sessions in Room SBOL</a:t>
-            </a:r>
-          </a:p>
-          <a:p>
-            <a:pPr lvl="1"/>
-            <a:r>
-              <a:rPr lang="en-US" dirty="0"/>
-              <a:t>pySBOL3 will support SBOL 3.0.1 shortly thereafter</a:t>
+              <a:t>pySBOL3 implements through the 3.0.1 specification (pre-release)</a:t>
             </a:r>
           </a:p>
           <a:p>
@@ -13779,65 +13749,7 @@
           <a:p>
             <a:r>
               <a:rPr lang="en-US" dirty="0"/>
-              <a:t>pySBOL3 Implements SBOL 3.0</a:t>
-            </a:r>
-          </a:p>
-        </p:txBody>
-      </p:sp>
-      <p:sp>
-        <p:nvSpPr>
-          <p:cNvPr id="3" name="Line Callout 1 2">
-            <a:extLst>
-              <a:ext uri="{FF2B5EF4-FFF2-40B4-BE49-F238E27FC236}">
-                <a16:creationId xmlns:a16="http://schemas.microsoft.com/office/drawing/2014/main" id="{F3F965B1-8D53-E64B-866E-DBB10F310529}"/>
-              </a:ext>
-            </a:extLst>
-          </p:cNvPr>
-          <p:cNvSpPr/>
-          <p:nvPr/>
-        </p:nvSpPr>
-        <p:spPr>
-          <a:xfrm>
-            <a:off x="8199557" y="2685252"/>
-            <a:ext cx="2783840" cy="1993427"/>
-          </a:xfrm>
-          <a:prstGeom prst="borderCallout1">
-            <a:avLst/>
-          </a:prstGeom>
-        </p:spPr>
-        <p:style>
-          <a:lnRef idx="1">
-            <a:schemeClr val="accent4"/>
-          </a:lnRef>
-          <a:fillRef idx="2">
-            <a:schemeClr val="accent4"/>
-          </a:fillRef>
-          <a:effectRef idx="1">
-            <a:schemeClr val="accent4"/>
-          </a:effectRef>
-          <a:fontRef idx="minor">
-            <a:schemeClr val="dk1"/>
-          </a:fontRef>
-        </p:style>
-        <p:txBody>
-          <a:bodyPr rtlCol="0" anchor="ctr"/>
-          <a:lstStyle/>
-          <a:p>
-            <a:pPr algn="ctr"/>
-            <a:r>
-              <a:rPr lang="en-US" dirty="0"/>
-              <a:t>What should we say about SBOL 3.0.1?</a:t>
-            </a:r>
-          </a:p>
-          <a:p>
-            <a:pPr algn="ctr"/>
-            <a:endParaRPr lang="en-US" dirty="0"/>
-          </a:p>
-          <a:p>
-            <a:pPr algn="ctr"/>
-            <a:r>
-              <a:rPr lang="en-US" dirty="0"/>
-              <a:t>Are there other SBOL specification sessions at IWBDA?</a:t>
+              <a:t>pySBOL3 Implements SBOL 3</a:t>
             </a:r>
           </a:p>
         </p:txBody>
@@ -15154,7 +15066,7 @@
                   </a:solidFill>
                   <a:latin typeface="Corbel"/>
                 </a:rPr>
-                <a:t>: SBO:0000251 (DNA)</a:t>
+                <a:t>: SBO: DNA</a:t>
               </a:r>
               <a:endParaRPr kumimoji="0" lang="en-US" sz="1800" b="0" i="0" u="none" strike="noStrike" kern="0" cap="none" spc="0" normalizeH="0" baseline="0" noProof="0" dirty="0">
                 <a:ln>
@@ -15204,7 +15116,7 @@
                   <a:ea typeface="+mn-ea"/>
                   <a:cs typeface="+mn-cs"/>
                 </a:rPr>
-                <a:t>role: SO:0000804 (Engineered Region)</a:t>
+                <a:t>role: SO: Engineered Region</a:t>
               </a:r>
             </a:p>
             <a:p>
@@ -16027,7 +15939,7 @@
                   </a:solidFill>
                   <a:latin typeface="Corbel"/>
                 </a:rPr>
-                <a:t>: SBO:0000251 (DNA)</a:t>
+                <a:t>: SBO: DNA</a:t>
               </a:r>
               <a:endParaRPr kumimoji="0" lang="en-US" sz="1800" b="0" i="0" u="none" strike="noStrike" kern="0" cap="none" spc="0" normalizeH="0" baseline="0" noProof="0" dirty="0">
                 <a:ln>
@@ -16077,7 +15989,7 @@
                   <a:ea typeface="+mn-ea"/>
                   <a:cs typeface="+mn-cs"/>
                 </a:rPr>
-                <a:t>role: SO:0000804 (Engineered Region)</a:t>
+                <a:t>role: SO: Engineered Region</a:t>
               </a:r>
             </a:p>
             <a:p>
@@ -16949,6 +16861,2627 @@
           <a:chExt cx="0" cy="0"/>
         </a:xfrm>
       </p:grpSpPr>
+      <p:grpSp>
+        <p:nvGrpSpPr>
+          <p:cNvPr id="4" name="Group 3">
+            <a:extLst>
+              <a:ext uri="{FF2B5EF4-FFF2-40B4-BE49-F238E27FC236}">
+                <a16:creationId xmlns:a16="http://schemas.microsoft.com/office/drawing/2014/main" id="{5FB6420A-EF75-174D-8573-834A5B8C9140}"/>
+              </a:ext>
+            </a:extLst>
+          </p:cNvPr>
+          <p:cNvGrpSpPr/>
+          <p:nvPr/>
+        </p:nvGrpSpPr>
+        <p:grpSpPr>
+          <a:xfrm>
+            <a:off x="1960026" y="1405735"/>
+            <a:ext cx="8738394" cy="4314180"/>
+            <a:chOff x="177800" y="772988"/>
+            <a:chExt cx="8738394" cy="4314180"/>
+          </a:xfrm>
+        </p:grpSpPr>
+        <p:sp>
+          <p:nvSpPr>
+            <p:cNvPr id="10" name="Slide Number Placeholder 3">
+              <a:extLst>
+                <a:ext uri="{FF2B5EF4-FFF2-40B4-BE49-F238E27FC236}">
+                  <a16:creationId xmlns:a16="http://schemas.microsoft.com/office/drawing/2014/main" id="{469834C2-E565-6745-BEAF-259694A975D0}"/>
+                </a:ext>
+              </a:extLst>
+            </p:cNvPr>
+            <p:cNvSpPr txBox="1">
+              <a:spLocks/>
+            </p:cNvSpPr>
+            <p:nvPr/>
+          </p:nvSpPr>
+          <p:spPr>
+            <a:xfrm>
+              <a:off x="6553200" y="4767263"/>
+              <a:ext cx="2133600" cy="273844"/>
+            </a:xfrm>
+            <a:prstGeom prst="rect">
+              <a:avLst/>
+            </a:prstGeom>
+          </p:spPr>
+          <p:txBody>
+            <a:bodyPr/>
+            <a:lstStyle>
+              <a:defPPr>
+                <a:defRPr lang="en-US"/>
+              </a:defPPr>
+              <a:lvl1pPr marL="0" algn="l" defTabSz="914400" rtl="0" eaLnBrk="1" latinLnBrk="0" hangingPunct="1">
+                <a:defRPr sz="1800" kern="1200">
+                  <a:solidFill>
+                    <a:schemeClr val="tx1"/>
+                  </a:solidFill>
+                  <a:latin typeface="+mn-lt"/>
+                  <a:ea typeface="+mn-ea"/>
+                  <a:cs typeface="+mn-cs"/>
+                </a:defRPr>
+              </a:lvl1pPr>
+              <a:lvl2pPr marL="457200" algn="l" defTabSz="914400" rtl="0" eaLnBrk="1" latinLnBrk="0" hangingPunct="1">
+                <a:defRPr sz="1800" kern="1200">
+                  <a:solidFill>
+                    <a:schemeClr val="tx1"/>
+                  </a:solidFill>
+                  <a:latin typeface="+mn-lt"/>
+                  <a:ea typeface="+mn-ea"/>
+                  <a:cs typeface="+mn-cs"/>
+                </a:defRPr>
+              </a:lvl2pPr>
+              <a:lvl3pPr marL="914400" algn="l" defTabSz="914400" rtl="0" eaLnBrk="1" latinLnBrk="0" hangingPunct="1">
+                <a:defRPr sz="1800" kern="1200">
+                  <a:solidFill>
+                    <a:schemeClr val="tx1"/>
+                  </a:solidFill>
+                  <a:latin typeface="+mn-lt"/>
+                  <a:ea typeface="+mn-ea"/>
+                  <a:cs typeface="+mn-cs"/>
+                </a:defRPr>
+              </a:lvl3pPr>
+              <a:lvl4pPr marL="1371600" algn="l" defTabSz="914400" rtl="0" eaLnBrk="1" latinLnBrk="0" hangingPunct="1">
+                <a:defRPr sz="1800" kern="1200">
+                  <a:solidFill>
+                    <a:schemeClr val="tx1"/>
+                  </a:solidFill>
+                  <a:latin typeface="+mn-lt"/>
+                  <a:ea typeface="+mn-ea"/>
+                  <a:cs typeface="+mn-cs"/>
+                </a:defRPr>
+              </a:lvl4pPr>
+              <a:lvl5pPr marL="1828800" algn="l" defTabSz="914400" rtl="0" eaLnBrk="1" latinLnBrk="0" hangingPunct="1">
+                <a:defRPr sz="1800" kern="1200">
+                  <a:solidFill>
+                    <a:schemeClr val="tx1"/>
+                  </a:solidFill>
+                  <a:latin typeface="+mn-lt"/>
+                  <a:ea typeface="+mn-ea"/>
+                  <a:cs typeface="+mn-cs"/>
+                </a:defRPr>
+              </a:lvl5pPr>
+              <a:lvl6pPr marL="2286000" algn="l" defTabSz="914400" rtl="0" eaLnBrk="1" latinLnBrk="0" hangingPunct="1">
+                <a:defRPr sz="1800" kern="1200">
+                  <a:solidFill>
+                    <a:schemeClr val="tx1"/>
+                  </a:solidFill>
+                  <a:latin typeface="+mn-lt"/>
+                  <a:ea typeface="+mn-ea"/>
+                  <a:cs typeface="+mn-cs"/>
+                </a:defRPr>
+              </a:lvl6pPr>
+              <a:lvl7pPr marL="2743200" algn="l" defTabSz="914400" rtl="0" eaLnBrk="1" latinLnBrk="0" hangingPunct="1">
+                <a:defRPr sz="1800" kern="1200">
+                  <a:solidFill>
+                    <a:schemeClr val="tx1"/>
+                  </a:solidFill>
+                  <a:latin typeface="+mn-lt"/>
+                  <a:ea typeface="+mn-ea"/>
+                  <a:cs typeface="+mn-cs"/>
+                </a:defRPr>
+              </a:lvl7pPr>
+              <a:lvl8pPr marL="3200400" algn="l" defTabSz="914400" rtl="0" eaLnBrk="1" latinLnBrk="0" hangingPunct="1">
+                <a:defRPr sz="1800" kern="1200">
+                  <a:solidFill>
+                    <a:schemeClr val="tx1"/>
+                  </a:solidFill>
+                  <a:latin typeface="+mn-lt"/>
+                  <a:ea typeface="+mn-ea"/>
+                  <a:cs typeface="+mn-cs"/>
+                </a:defRPr>
+              </a:lvl8pPr>
+              <a:lvl9pPr marL="3657600" algn="l" defTabSz="914400" rtl="0" eaLnBrk="1" latinLnBrk="0" hangingPunct="1">
+                <a:defRPr sz="1800" kern="1200">
+                  <a:solidFill>
+                    <a:schemeClr val="tx1"/>
+                  </a:solidFill>
+                  <a:latin typeface="+mn-lt"/>
+                  <a:ea typeface="+mn-ea"/>
+                  <a:cs typeface="+mn-cs"/>
+                </a:defRPr>
+              </a:lvl9pPr>
+            </a:lstStyle>
+            <a:p>
+              <a:fld id="{0200C452-46A9-46DE-B3AC-9F1C16DAFCC5}" type="slidenum">
+                <a:rPr lang="en-US" smtClean="0"/>
+                <a:pPr/>
+                <a:t>8</a:t>
+              </a:fld>
+              <a:endParaRPr lang="en-US"/>
+            </a:p>
+          </p:txBody>
+        </p:sp>
+        <p:sp>
+          <p:nvSpPr>
+            <p:cNvPr id="11" name="Rectangle 10">
+              <a:extLst>
+                <a:ext uri="{FF2B5EF4-FFF2-40B4-BE49-F238E27FC236}">
+                  <a16:creationId xmlns:a16="http://schemas.microsoft.com/office/drawing/2014/main" id="{40CC3433-215E-D545-938F-0F451F107926}"/>
+                </a:ext>
+              </a:extLst>
+            </p:cNvPr>
+            <p:cNvSpPr/>
+            <p:nvPr/>
+          </p:nvSpPr>
+          <p:spPr>
+            <a:xfrm>
+              <a:off x="2641600" y="772988"/>
+              <a:ext cx="3860800" cy="1016000"/>
+            </a:xfrm>
+            <a:prstGeom prst="rect">
+              <a:avLst/>
+            </a:prstGeom>
+            <a:solidFill>
+              <a:srgbClr val="30ACEC">
+                <a:lumMod val="20000"/>
+                <a:lumOff val="80000"/>
+              </a:srgbClr>
+            </a:solidFill>
+            <a:ln w="15875" cap="rnd" cmpd="sng" algn="ctr">
+              <a:solidFill>
+                <a:srgbClr val="30ACEC">
+                  <a:shade val="50000"/>
+                </a:srgbClr>
+              </a:solidFill>
+              <a:prstDash val="solid"/>
+            </a:ln>
+            <a:effectLst/>
+          </p:spPr>
+          <p:txBody>
+            <a:bodyPr rtlCol="0" anchor="t"/>
+            <a:lstStyle/>
+            <a:p>
+              <a:pPr marL="0" marR="0" lvl="0" indent="0" defTabSz="914400" eaLnBrk="1" fontAlgn="auto" latinLnBrk="0" hangingPunct="1">
+                <a:lnSpc>
+                  <a:spcPct val="100000"/>
+                </a:lnSpc>
+                <a:spcBef>
+                  <a:spcPts val="0"/>
+                </a:spcBef>
+                <a:spcAft>
+                  <a:spcPts val="0"/>
+                </a:spcAft>
+                <a:buClrTx/>
+                <a:buSzTx/>
+                <a:buFontTx/>
+                <a:buNone/>
+                <a:tabLst/>
+                <a:defRPr/>
+              </a:pPr>
+              <a:r>
+                <a:rPr kumimoji="0" lang="en-US" sz="1800" b="1" i="0" u="none" strike="noStrike" kern="0" cap="none" spc="0" normalizeH="0" baseline="0" noProof="0" dirty="0">
+                  <a:ln>
+                    <a:noFill/>
+                  </a:ln>
+                  <a:solidFill>
+                    <a:prstClr val="black"/>
+                  </a:solidFill>
+                  <a:effectLst/>
+                  <a:uLnTx/>
+                  <a:uFillTx/>
+                  <a:latin typeface="Corbel"/>
+                  <a:ea typeface="+mn-ea"/>
+                  <a:cs typeface="+mn-cs"/>
+                </a:rPr>
+                <a:t>Component: </a:t>
+              </a:r>
+              <a:r>
+                <a:rPr kumimoji="0" lang="en-US" sz="1800" b="0" i="0" u="none" strike="noStrike" kern="0" cap="none" spc="0" normalizeH="0" baseline="0" noProof="0" dirty="0">
+                  <a:ln>
+                    <a:noFill/>
+                  </a:ln>
+                  <a:solidFill>
+                    <a:prstClr val="black"/>
+                  </a:solidFill>
+                  <a:effectLst/>
+                  <a:uLnTx/>
+                  <a:uFillTx/>
+                  <a:latin typeface="Corbel"/>
+                  <a:ea typeface="+mn-ea"/>
+                  <a:cs typeface="+mn-cs"/>
+                </a:rPr>
+                <a:t>iGEM#I13504</a:t>
+              </a:r>
+            </a:p>
+            <a:p>
+              <a:pPr marL="457200" marR="0" lvl="0" indent="-457200" defTabSz="914400" eaLnBrk="1" fontAlgn="auto" latinLnBrk="0" hangingPunct="1">
+                <a:lnSpc>
+                  <a:spcPct val="100000"/>
+                </a:lnSpc>
+                <a:spcBef>
+                  <a:spcPts val="0"/>
+                </a:spcBef>
+                <a:spcAft>
+                  <a:spcPts val="0"/>
+                </a:spcAft>
+                <a:buClrTx/>
+                <a:buSzTx/>
+                <a:buFontTx/>
+                <a:buNone/>
+                <a:tabLst/>
+                <a:defRPr/>
+              </a:pPr>
+              <a:endParaRPr kumimoji="0" lang="en-US" sz="1800" b="0" i="0" u="none" strike="noStrike" kern="0" cap="none" spc="0" normalizeH="0" baseline="0" noProof="0" dirty="0">
+                <a:ln>
+                  <a:noFill/>
+                </a:ln>
+                <a:solidFill>
+                  <a:prstClr val="black"/>
+                </a:solidFill>
+                <a:effectLst/>
+                <a:uLnTx/>
+                <a:uFillTx/>
+                <a:latin typeface="Corbel"/>
+                <a:ea typeface="+mn-ea"/>
+                <a:cs typeface="+mn-cs"/>
+              </a:endParaRPr>
+            </a:p>
+          </p:txBody>
+        </p:sp>
+        <p:grpSp>
+          <p:nvGrpSpPr>
+            <p:cNvPr id="12" name="Group 11">
+              <a:extLst>
+                <a:ext uri="{FF2B5EF4-FFF2-40B4-BE49-F238E27FC236}">
+                  <a16:creationId xmlns:a16="http://schemas.microsoft.com/office/drawing/2014/main" id="{39AB67E6-DAE2-C14B-AB39-EF942500CFFC}"/>
+                </a:ext>
+              </a:extLst>
+            </p:cNvPr>
+            <p:cNvGrpSpPr/>
+            <p:nvPr/>
+          </p:nvGrpSpPr>
+          <p:grpSpPr>
+            <a:xfrm>
+              <a:off x="3511549" y="1296684"/>
+              <a:ext cx="2019300" cy="533400"/>
+              <a:chOff x="3581400" y="5067300"/>
+              <a:chExt cx="2019300" cy="533400"/>
+            </a:xfrm>
+          </p:grpSpPr>
+          <p:cxnSp>
+            <p:nvCxnSpPr>
+              <p:cNvPr id="13" name="Straight Connector 12">
+                <a:extLst>
+                  <a:ext uri="{FF2B5EF4-FFF2-40B4-BE49-F238E27FC236}">
+                    <a16:creationId xmlns:a16="http://schemas.microsoft.com/office/drawing/2014/main" id="{1752130F-029A-274C-BA50-19772C3C8679}"/>
+                  </a:ext>
+                </a:extLst>
+              </p:cNvPr>
+              <p:cNvCxnSpPr/>
+              <p:nvPr/>
+            </p:nvCxnSpPr>
+            <p:spPr>
+              <a:xfrm>
+                <a:off x="3581400" y="5422900"/>
+                <a:ext cx="2019300" cy="0"/>
+              </a:xfrm>
+              <a:prstGeom prst="line">
+                <a:avLst/>
+              </a:prstGeom>
+              <a:noFill/>
+              <a:ln w="38100" cap="rnd" cmpd="sng" algn="ctr">
+                <a:solidFill>
+                  <a:sysClr val="windowText" lastClr="000000"/>
+                </a:solidFill>
+                <a:prstDash val="solid"/>
+              </a:ln>
+              <a:effectLst/>
+            </p:spPr>
+          </p:cxnSp>
+          <p:sp>
+            <p:nvSpPr>
+              <p:cNvPr id="14" name="Chord 13">
+                <a:extLst>
+                  <a:ext uri="{FF2B5EF4-FFF2-40B4-BE49-F238E27FC236}">
+                    <a16:creationId xmlns:a16="http://schemas.microsoft.com/office/drawing/2014/main" id="{0AC0B657-4C7A-AD41-9039-F7CBD1FF4131}"/>
+                  </a:ext>
+                </a:extLst>
+              </p:cNvPr>
+              <p:cNvSpPr/>
+              <p:nvPr/>
+            </p:nvSpPr>
+            <p:spPr>
+              <a:xfrm>
+                <a:off x="3733800" y="5194300"/>
+                <a:ext cx="431800" cy="406400"/>
+              </a:xfrm>
+              <a:prstGeom prst="chord">
+                <a:avLst>
+                  <a:gd name="adj1" fmla="val 10690026"/>
+                  <a:gd name="adj2" fmla="val 214580"/>
+                </a:avLst>
+              </a:prstGeom>
+              <a:solidFill>
+                <a:srgbClr val="A666E1"/>
+              </a:solidFill>
+              <a:ln w="15875" cap="rnd" cmpd="sng" algn="ctr">
+                <a:solidFill>
+                  <a:srgbClr val="A666E1">
+                    <a:lumMod val="75000"/>
+                  </a:srgbClr>
+                </a:solidFill>
+                <a:prstDash val="solid"/>
+              </a:ln>
+              <a:effectLst/>
+            </p:spPr>
+            <p:txBody>
+              <a:bodyPr rtlCol="0" anchor="ctr"/>
+              <a:lstStyle/>
+              <a:p>
+                <a:pPr marL="0" marR="0" lvl="0" indent="0" algn="ctr" defTabSz="914400" eaLnBrk="1" fontAlgn="auto" latinLnBrk="0" hangingPunct="1">
+                  <a:lnSpc>
+                    <a:spcPct val="100000"/>
+                  </a:lnSpc>
+                  <a:spcBef>
+                    <a:spcPts val="0"/>
+                  </a:spcBef>
+                  <a:spcAft>
+                    <a:spcPts val="0"/>
+                  </a:spcAft>
+                  <a:buClrTx/>
+                  <a:buSzTx/>
+                  <a:buFontTx/>
+                  <a:buNone/>
+                  <a:tabLst/>
+                  <a:defRPr/>
+                </a:pPr>
+                <a:endParaRPr kumimoji="0" lang="en-US" sz="1800" b="0" i="0" u="none" strike="noStrike" kern="0" cap="none" spc="0" normalizeH="0" baseline="0" noProof="0">
+                  <a:ln>
+                    <a:noFill/>
+                  </a:ln>
+                  <a:solidFill>
+                    <a:prstClr val="white"/>
+                  </a:solidFill>
+                  <a:effectLst/>
+                  <a:uLnTx/>
+                  <a:uFillTx/>
+                  <a:latin typeface="Corbel"/>
+                  <a:ea typeface="+mn-ea"/>
+                  <a:cs typeface="+mn-cs"/>
+                </a:endParaRPr>
+              </a:p>
+            </p:txBody>
+          </p:sp>
+          <p:sp>
+            <p:nvSpPr>
+              <p:cNvPr id="15" name="Pentagon 14">
+                <a:extLst>
+                  <a:ext uri="{FF2B5EF4-FFF2-40B4-BE49-F238E27FC236}">
+                    <a16:creationId xmlns:a16="http://schemas.microsoft.com/office/drawing/2014/main" id="{B4FC4F90-B6ED-D34A-A7FE-0E2781AA8368}"/>
+                  </a:ext>
+                </a:extLst>
+              </p:cNvPr>
+              <p:cNvSpPr/>
+              <p:nvPr/>
+            </p:nvSpPr>
+            <p:spPr>
+              <a:xfrm>
+                <a:off x="4337050" y="5295023"/>
+                <a:ext cx="742950" cy="228600"/>
+              </a:xfrm>
+              <a:prstGeom prst="homePlate">
+                <a:avLst/>
+              </a:prstGeom>
+              <a:solidFill>
+                <a:srgbClr val="80C34F"/>
+              </a:solidFill>
+              <a:ln w="15875" cap="rnd" cmpd="sng" algn="ctr">
+                <a:solidFill>
+                  <a:srgbClr val="80C34F">
+                    <a:lumMod val="75000"/>
+                  </a:srgbClr>
+                </a:solidFill>
+                <a:prstDash val="solid"/>
+              </a:ln>
+              <a:effectLst/>
+            </p:spPr>
+            <p:txBody>
+              <a:bodyPr rtlCol="0" anchor="ctr"/>
+              <a:lstStyle/>
+              <a:p>
+                <a:pPr marL="0" marR="0" lvl="0" indent="0" algn="ctr" defTabSz="914400" eaLnBrk="1" fontAlgn="auto" latinLnBrk="0" hangingPunct="1">
+                  <a:lnSpc>
+                    <a:spcPct val="100000"/>
+                  </a:lnSpc>
+                  <a:spcBef>
+                    <a:spcPts val="0"/>
+                  </a:spcBef>
+                  <a:spcAft>
+                    <a:spcPts val="0"/>
+                  </a:spcAft>
+                  <a:buClrTx/>
+                  <a:buSzTx/>
+                  <a:buFontTx/>
+                  <a:buNone/>
+                  <a:tabLst/>
+                  <a:defRPr/>
+                </a:pPr>
+                <a:endParaRPr kumimoji="0" lang="en-US" sz="1800" b="0" i="0" u="none" strike="noStrike" kern="0" cap="none" spc="0" normalizeH="0" baseline="0" noProof="0">
+                  <a:ln>
+                    <a:noFill/>
+                  </a:ln>
+                  <a:solidFill>
+                    <a:prstClr val="white"/>
+                  </a:solidFill>
+                  <a:effectLst/>
+                  <a:uLnTx/>
+                  <a:uFillTx/>
+                  <a:latin typeface="Corbel"/>
+                  <a:ea typeface="+mn-ea"/>
+                  <a:cs typeface="+mn-cs"/>
+                </a:endParaRPr>
+              </a:p>
+            </p:txBody>
+          </p:sp>
+          <p:sp>
+            <p:nvSpPr>
+              <p:cNvPr id="16" name="Left-Right-Up Arrow 15">
+                <a:extLst>
+                  <a:ext uri="{FF2B5EF4-FFF2-40B4-BE49-F238E27FC236}">
+                    <a16:creationId xmlns:a16="http://schemas.microsoft.com/office/drawing/2014/main" id="{F4832A18-64C6-9B4C-8F60-43664F709203}"/>
+                  </a:ext>
+                </a:extLst>
+              </p:cNvPr>
+              <p:cNvSpPr/>
+              <p:nvPr/>
+            </p:nvSpPr>
+            <p:spPr>
+              <a:xfrm rot="10800000">
+                <a:off x="5175250" y="5067300"/>
+                <a:ext cx="311150" cy="330200"/>
+              </a:xfrm>
+              <a:prstGeom prst="leftRightUpArrow">
+                <a:avLst>
+                  <a:gd name="adj1" fmla="val 18220"/>
+                  <a:gd name="adj2" fmla="val 8051"/>
+                  <a:gd name="adj3" fmla="val 0"/>
+                </a:avLst>
+              </a:prstGeom>
+              <a:solidFill>
+                <a:srgbClr val="D64787"/>
+              </a:solidFill>
+              <a:ln w="15875" cap="rnd" cmpd="sng" algn="ctr">
+                <a:solidFill>
+                  <a:srgbClr val="D64787">
+                    <a:lumMod val="75000"/>
+                  </a:srgbClr>
+                </a:solidFill>
+                <a:prstDash val="solid"/>
+              </a:ln>
+              <a:effectLst/>
+            </p:spPr>
+            <p:txBody>
+              <a:bodyPr rtlCol="0" anchor="ctr"/>
+              <a:lstStyle/>
+              <a:p>
+                <a:pPr marL="0" marR="0" lvl="0" indent="0" algn="ctr" defTabSz="914400" eaLnBrk="1" fontAlgn="auto" latinLnBrk="0" hangingPunct="1">
+                  <a:lnSpc>
+                    <a:spcPct val="100000"/>
+                  </a:lnSpc>
+                  <a:spcBef>
+                    <a:spcPts val="0"/>
+                  </a:spcBef>
+                  <a:spcAft>
+                    <a:spcPts val="0"/>
+                  </a:spcAft>
+                  <a:buClrTx/>
+                  <a:buSzTx/>
+                  <a:buFontTx/>
+                  <a:buNone/>
+                  <a:tabLst/>
+                  <a:defRPr/>
+                </a:pPr>
+                <a:endParaRPr kumimoji="0" lang="en-US" sz="1800" b="0" i="0" u="none" strike="noStrike" kern="0" cap="none" spc="0" normalizeH="0" baseline="0" noProof="0">
+                  <a:ln>
+                    <a:noFill/>
+                  </a:ln>
+                  <a:solidFill>
+                    <a:prstClr val="white"/>
+                  </a:solidFill>
+                  <a:effectLst/>
+                  <a:uLnTx/>
+                  <a:uFillTx/>
+                  <a:latin typeface="Corbel"/>
+                  <a:ea typeface="+mn-ea"/>
+                  <a:cs typeface="+mn-cs"/>
+                </a:endParaRPr>
+              </a:p>
+            </p:txBody>
+          </p:sp>
+        </p:grpSp>
+        <p:grpSp>
+          <p:nvGrpSpPr>
+            <p:cNvPr id="17" name="Group 16">
+              <a:extLst>
+                <a:ext uri="{FF2B5EF4-FFF2-40B4-BE49-F238E27FC236}">
+                  <a16:creationId xmlns:a16="http://schemas.microsoft.com/office/drawing/2014/main" id="{1386F503-ABF3-3843-845D-CD95710CA45E}"/>
+                </a:ext>
+              </a:extLst>
+            </p:cNvPr>
+            <p:cNvGrpSpPr/>
+            <p:nvPr/>
+          </p:nvGrpSpPr>
+          <p:grpSpPr>
+            <a:xfrm>
+              <a:off x="177800" y="2505747"/>
+              <a:ext cx="8738394" cy="2581421"/>
+              <a:chOff x="228600" y="3974951"/>
+              <a:chExt cx="8738394" cy="2581421"/>
+            </a:xfrm>
+          </p:grpSpPr>
+          <p:grpSp>
+            <p:nvGrpSpPr>
+              <p:cNvPr id="18" name="Group 17">
+                <a:extLst>
+                  <a:ext uri="{FF2B5EF4-FFF2-40B4-BE49-F238E27FC236}">
+                    <a16:creationId xmlns:a16="http://schemas.microsoft.com/office/drawing/2014/main" id="{080B282A-8B38-F249-BB4C-E62D9270AE57}"/>
+                  </a:ext>
+                </a:extLst>
+              </p:cNvPr>
+              <p:cNvGrpSpPr/>
+              <p:nvPr/>
+            </p:nvGrpSpPr>
+            <p:grpSpPr>
+              <a:xfrm>
+                <a:off x="228600" y="4444998"/>
+                <a:ext cx="2711452" cy="2111374"/>
+                <a:chOff x="-146051" y="4432299"/>
+                <a:chExt cx="2711452" cy="2111374"/>
+              </a:xfrm>
+            </p:grpSpPr>
+            <p:sp>
+              <p:nvSpPr>
+                <p:cNvPr id="35" name="Rectangle 34">
+                  <a:extLst>
+                    <a:ext uri="{FF2B5EF4-FFF2-40B4-BE49-F238E27FC236}">
+                      <a16:creationId xmlns:a16="http://schemas.microsoft.com/office/drawing/2014/main" id="{754BFE91-1105-4545-B3D0-5E00796DD2C7}"/>
+                    </a:ext>
+                  </a:extLst>
+                </p:cNvPr>
+                <p:cNvSpPr/>
+                <p:nvPr/>
+              </p:nvSpPr>
+              <p:spPr>
+                <a:xfrm>
+                  <a:off x="-146051" y="4432299"/>
+                  <a:ext cx="2711452" cy="2060575"/>
+                </a:xfrm>
+                <a:prstGeom prst="rect">
+                  <a:avLst/>
+                </a:prstGeom>
+                <a:solidFill>
+                  <a:srgbClr val="30ACEC">
+                    <a:lumMod val="20000"/>
+                    <a:lumOff val="80000"/>
+                  </a:srgbClr>
+                </a:solidFill>
+                <a:ln w="15875" cap="rnd" cmpd="sng" algn="ctr">
+                  <a:solidFill>
+                    <a:srgbClr val="30ACEC">
+                      <a:shade val="50000"/>
+                    </a:srgbClr>
+                  </a:solidFill>
+                  <a:prstDash val="solid"/>
+                </a:ln>
+                <a:effectLst/>
+              </p:spPr>
+              <p:txBody>
+                <a:bodyPr rtlCol="0" anchor="t"/>
+                <a:lstStyle/>
+                <a:p>
+                  <a:pPr marL="0" marR="0" lvl="0" indent="0" defTabSz="914400" eaLnBrk="1" fontAlgn="auto" latinLnBrk="0" hangingPunct="1">
+                    <a:lnSpc>
+                      <a:spcPct val="100000"/>
+                    </a:lnSpc>
+                    <a:spcBef>
+                      <a:spcPts val="0"/>
+                    </a:spcBef>
+                    <a:spcAft>
+                      <a:spcPts val="0"/>
+                    </a:spcAft>
+                    <a:buClrTx/>
+                    <a:buSzTx/>
+                    <a:buFontTx/>
+                    <a:buNone/>
+                    <a:tabLst/>
+                    <a:defRPr/>
+                  </a:pPr>
+                  <a:r>
+                    <a:rPr kumimoji="0" lang="en-US" sz="1800" b="1" i="0" u="sng" strike="noStrike" kern="0" cap="none" spc="0" normalizeH="0" baseline="0" noProof="0" dirty="0">
+                      <a:ln>
+                        <a:noFill/>
+                      </a:ln>
+                      <a:solidFill>
+                        <a:prstClr val="black"/>
+                      </a:solidFill>
+                      <a:effectLst/>
+                      <a:uLnTx/>
+                      <a:uFillTx/>
+                      <a:latin typeface="Corbel"/>
+                      <a:ea typeface="+mn-ea"/>
+                      <a:cs typeface="+mn-cs"/>
+                    </a:rPr>
+                    <a:t>Component</a:t>
+                  </a:r>
+                </a:p>
+                <a:p>
+                  <a:pPr marL="0" marR="0" lvl="0" indent="0" defTabSz="914400" eaLnBrk="1" fontAlgn="auto" latinLnBrk="0" hangingPunct="1">
+                    <a:lnSpc>
+                      <a:spcPct val="100000"/>
+                    </a:lnSpc>
+                    <a:spcBef>
+                      <a:spcPts val="0"/>
+                    </a:spcBef>
+                    <a:spcAft>
+                      <a:spcPts val="0"/>
+                    </a:spcAft>
+                    <a:buClrTx/>
+                    <a:buSzTx/>
+                    <a:buFontTx/>
+                    <a:buNone/>
+                    <a:tabLst/>
+                    <a:defRPr/>
+                  </a:pPr>
+                  <a:r>
+                    <a:rPr kumimoji="0" lang="en-US" sz="1800" b="0" i="0" u="none" strike="noStrike" kern="0" cap="none" spc="0" normalizeH="0" baseline="0" noProof="0" dirty="0">
+                      <a:ln>
+                        <a:noFill/>
+                      </a:ln>
+                      <a:solidFill>
+                        <a:prstClr val="black"/>
+                      </a:solidFill>
+                      <a:effectLst/>
+                      <a:uLnTx/>
+                      <a:uFillTx/>
+                      <a:latin typeface="Corbel"/>
+                      <a:ea typeface="+mn-ea"/>
+                      <a:cs typeface="+mn-cs"/>
+                    </a:rPr>
+                    <a:t>identity: iGEM#B0034</a:t>
+                  </a:r>
+                </a:p>
+                <a:p>
+                  <a:pPr marL="0" marR="0" lvl="0" indent="0" defTabSz="914400" eaLnBrk="1" fontAlgn="auto" latinLnBrk="0" hangingPunct="1">
+                    <a:lnSpc>
+                      <a:spcPct val="100000"/>
+                    </a:lnSpc>
+                    <a:spcBef>
+                      <a:spcPts val="0"/>
+                    </a:spcBef>
+                    <a:spcAft>
+                      <a:spcPts val="0"/>
+                    </a:spcAft>
+                    <a:buClrTx/>
+                    <a:buSzTx/>
+                    <a:buFontTx/>
+                    <a:buNone/>
+                    <a:tabLst/>
+                    <a:defRPr/>
+                  </a:pPr>
+                  <a:r>
+                    <a:rPr kumimoji="0" lang="en-US" sz="1800" b="0" i="0" u="none" strike="noStrike" kern="0" cap="none" spc="0" normalizeH="0" baseline="0" noProof="0" dirty="0">
+                      <a:ln>
+                        <a:noFill/>
+                      </a:ln>
+                      <a:solidFill>
+                        <a:prstClr val="black"/>
+                      </a:solidFill>
+                      <a:effectLst/>
+                      <a:uLnTx/>
+                      <a:uFillTx/>
+                      <a:latin typeface="Corbel"/>
+                      <a:ea typeface="+mn-ea"/>
+                      <a:cs typeface="+mn-cs"/>
+                    </a:rPr>
+                    <a:t>name: RBS (</a:t>
+                  </a:r>
+                  <a:r>
+                    <a:rPr kumimoji="0" lang="en-US" sz="1800" b="0" i="0" u="none" strike="noStrike" kern="0" cap="none" spc="0" normalizeH="0" baseline="0" noProof="0" dirty="0" err="1">
+                      <a:ln>
+                        <a:noFill/>
+                      </a:ln>
+                      <a:solidFill>
+                        <a:prstClr val="black"/>
+                      </a:solidFill>
+                      <a:effectLst/>
+                      <a:uLnTx/>
+                      <a:uFillTx/>
+                      <a:latin typeface="Corbel"/>
+                      <a:ea typeface="+mn-ea"/>
+                      <a:cs typeface="+mn-cs"/>
+                    </a:rPr>
+                    <a:t>Elowitz</a:t>
+                  </a:r>
+                  <a:r>
+                    <a:rPr kumimoji="0" lang="en-US" sz="1800" b="0" i="0" u="none" strike="noStrike" kern="0" cap="none" spc="0" normalizeH="0" baseline="0" noProof="0" dirty="0">
+                      <a:ln>
+                        <a:noFill/>
+                      </a:ln>
+                      <a:solidFill>
+                        <a:prstClr val="black"/>
+                      </a:solidFill>
+                      <a:effectLst/>
+                      <a:uLnTx/>
+                      <a:uFillTx/>
+                      <a:latin typeface="Corbel"/>
+                      <a:ea typeface="+mn-ea"/>
+                      <a:cs typeface="+mn-cs"/>
+                    </a:rPr>
+                    <a:t> 1999)</a:t>
+                  </a:r>
+                </a:p>
+                <a:p>
+                  <a:pPr marL="457200" lvl="0" indent="-457200"/>
+                  <a:r>
+                    <a:rPr kumimoji="0" lang="en-US" sz="1800" b="0" i="0" u="none" strike="noStrike" kern="0" cap="none" spc="0" normalizeH="0" baseline="0" noProof="0" dirty="0">
+                      <a:ln>
+                        <a:noFill/>
+                      </a:ln>
+                      <a:solidFill>
+                        <a:prstClr val="black"/>
+                      </a:solidFill>
+                      <a:effectLst/>
+                      <a:uLnTx/>
+                      <a:uFillTx/>
+                      <a:latin typeface="Corbel"/>
+                      <a:ea typeface="+mn-ea"/>
+                      <a:cs typeface="+mn-cs"/>
+                    </a:rPr>
+                    <a:t>type: </a:t>
+                  </a:r>
+                  <a:r>
+                    <a:rPr lang="en-US" kern="0" dirty="0">
+                      <a:solidFill>
+                        <a:prstClr val="black"/>
+                      </a:solidFill>
+                      <a:latin typeface="Corbel"/>
+                    </a:rPr>
+                    <a:t>SBO: DNA</a:t>
+                  </a:r>
+                  <a:endParaRPr kumimoji="0" lang="en-US" sz="1800" b="0" i="0" u="none" strike="noStrike" kern="0" cap="none" spc="0" normalizeH="0" baseline="0" noProof="0" dirty="0">
+                    <a:ln>
+                      <a:noFill/>
+                    </a:ln>
+                    <a:solidFill>
+                      <a:prstClr val="black"/>
+                    </a:solidFill>
+                    <a:effectLst/>
+                    <a:uLnTx/>
+                    <a:uFillTx/>
+                    <a:latin typeface="Corbel"/>
+                    <a:ea typeface="+mn-ea"/>
+                    <a:cs typeface="+mn-cs"/>
+                  </a:endParaRPr>
+                </a:p>
+                <a:p>
+                  <a:pPr marL="457200" marR="0" lvl="0" indent="-457200" defTabSz="914400" eaLnBrk="1" fontAlgn="auto" latinLnBrk="0" hangingPunct="1">
+                    <a:lnSpc>
+                      <a:spcPct val="100000"/>
+                    </a:lnSpc>
+                    <a:spcBef>
+                      <a:spcPts val="0"/>
+                    </a:spcBef>
+                    <a:spcAft>
+                      <a:spcPts val="0"/>
+                    </a:spcAft>
+                    <a:buClrTx/>
+                    <a:buSzTx/>
+                    <a:buFontTx/>
+                    <a:buNone/>
+                    <a:tabLst/>
+                    <a:defRPr/>
+                  </a:pPr>
+                  <a:r>
+                    <a:rPr kumimoji="0" lang="en-US" sz="1800" b="0" i="0" u="none" strike="noStrike" kern="0" cap="none" spc="0" normalizeH="0" baseline="0" noProof="0" dirty="0">
+                      <a:ln>
+                        <a:noFill/>
+                      </a:ln>
+                      <a:solidFill>
+                        <a:prstClr val="black"/>
+                      </a:solidFill>
+                      <a:effectLst/>
+                      <a:uLnTx/>
+                      <a:uFillTx/>
+                      <a:latin typeface="Corbel"/>
+                      <a:ea typeface="+mn-ea"/>
+                      <a:cs typeface="+mn-cs"/>
+                    </a:rPr>
+                    <a:t>role: SO: Ribosome Entry Site</a:t>
+                  </a:r>
+                </a:p>
+                <a:p>
+                  <a:pPr marL="457200" marR="0" lvl="0" indent="-457200" defTabSz="914400" eaLnBrk="1" fontAlgn="auto" latinLnBrk="0" hangingPunct="1">
+                    <a:lnSpc>
+                      <a:spcPct val="100000"/>
+                    </a:lnSpc>
+                    <a:spcBef>
+                      <a:spcPts val="0"/>
+                    </a:spcBef>
+                    <a:spcAft>
+                      <a:spcPts val="0"/>
+                    </a:spcAft>
+                    <a:buClrTx/>
+                    <a:buSzTx/>
+                    <a:buFontTx/>
+                    <a:buNone/>
+                    <a:tabLst/>
+                    <a:defRPr/>
+                  </a:pPr>
+                  <a:endParaRPr kumimoji="0" lang="en-US" sz="1800" b="0" i="0" u="none" strike="noStrike" kern="0" cap="none" spc="0" normalizeH="0" baseline="0" noProof="0" dirty="0">
+                    <a:ln>
+                      <a:noFill/>
+                    </a:ln>
+                    <a:solidFill>
+                      <a:prstClr val="black"/>
+                    </a:solidFill>
+                    <a:effectLst/>
+                    <a:uLnTx/>
+                    <a:uFillTx/>
+                    <a:latin typeface="Corbel"/>
+                    <a:ea typeface="+mn-ea"/>
+                    <a:cs typeface="+mn-cs"/>
+                  </a:endParaRPr>
+                </a:p>
+              </p:txBody>
+            </p:sp>
+            <p:grpSp>
+              <p:nvGrpSpPr>
+                <p:cNvPr id="36" name="Group 35">
+                  <a:extLst>
+                    <a:ext uri="{FF2B5EF4-FFF2-40B4-BE49-F238E27FC236}">
+                      <a16:creationId xmlns:a16="http://schemas.microsoft.com/office/drawing/2014/main" id="{9E70AFA9-A1D7-FD42-AAB3-8DC5EDDD46B2}"/>
+                    </a:ext>
+                  </a:extLst>
+                </p:cNvPr>
+                <p:cNvGrpSpPr/>
+                <p:nvPr/>
+              </p:nvGrpSpPr>
+              <p:grpSpPr>
+                <a:xfrm>
+                  <a:off x="866773" y="6137273"/>
+                  <a:ext cx="758827" cy="406400"/>
+                  <a:chOff x="3581400" y="5257800"/>
+                  <a:chExt cx="758827" cy="406400"/>
+                </a:xfrm>
+              </p:grpSpPr>
+              <p:cxnSp>
+                <p:nvCxnSpPr>
+                  <p:cNvPr id="37" name="Straight Connector 36">
+                    <a:extLst>
+                      <a:ext uri="{FF2B5EF4-FFF2-40B4-BE49-F238E27FC236}">
+                        <a16:creationId xmlns:a16="http://schemas.microsoft.com/office/drawing/2014/main" id="{EB280D3D-A91F-8747-91F0-717216FDDFAB}"/>
+                      </a:ext>
+                    </a:extLst>
+                  </p:cNvPr>
+                  <p:cNvCxnSpPr/>
+                  <p:nvPr/>
+                </p:nvCxnSpPr>
+                <p:spPr>
+                  <a:xfrm>
+                    <a:off x="3581400" y="5486400"/>
+                    <a:ext cx="758827" cy="0"/>
+                  </a:xfrm>
+                  <a:prstGeom prst="line">
+                    <a:avLst/>
+                  </a:prstGeom>
+                  <a:noFill/>
+                  <a:ln w="38100" cap="rnd" cmpd="sng" algn="ctr">
+                    <a:solidFill>
+                      <a:sysClr val="windowText" lastClr="000000"/>
+                    </a:solidFill>
+                    <a:prstDash val="solid"/>
+                  </a:ln>
+                  <a:effectLst/>
+                </p:spPr>
+              </p:cxnSp>
+              <p:sp>
+                <p:nvSpPr>
+                  <p:cNvPr id="38" name="Chord 37">
+                    <a:extLst>
+                      <a:ext uri="{FF2B5EF4-FFF2-40B4-BE49-F238E27FC236}">
+                        <a16:creationId xmlns:a16="http://schemas.microsoft.com/office/drawing/2014/main" id="{330B4D62-6980-2B43-8C74-ED0D85439E06}"/>
+                      </a:ext>
+                    </a:extLst>
+                  </p:cNvPr>
+                  <p:cNvSpPr/>
+                  <p:nvPr/>
+                </p:nvSpPr>
+                <p:spPr>
+                  <a:xfrm>
+                    <a:off x="3733800" y="5257800"/>
+                    <a:ext cx="431800" cy="406400"/>
+                  </a:xfrm>
+                  <a:prstGeom prst="chord">
+                    <a:avLst>
+                      <a:gd name="adj1" fmla="val 10690026"/>
+                      <a:gd name="adj2" fmla="val 214580"/>
+                    </a:avLst>
+                  </a:prstGeom>
+                  <a:solidFill>
+                    <a:srgbClr val="A666E1"/>
+                  </a:solidFill>
+                  <a:ln w="15875" cap="rnd" cmpd="sng" algn="ctr">
+                    <a:solidFill>
+                      <a:srgbClr val="A666E1">
+                        <a:lumMod val="75000"/>
+                      </a:srgbClr>
+                    </a:solidFill>
+                    <a:prstDash val="solid"/>
+                  </a:ln>
+                  <a:effectLst/>
+                </p:spPr>
+                <p:txBody>
+                  <a:bodyPr rtlCol="0" anchor="ctr"/>
+                  <a:lstStyle/>
+                  <a:p>
+                    <a:pPr marL="0" marR="0" lvl="0" indent="0" algn="ctr" defTabSz="914400" eaLnBrk="1" fontAlgn="auto" latinLnBrk="0" hangingPunct="1">
+                      <a:lnSpc>
+                        <a:spcPct val="100000"/>
+                      </a:lnSpc>
+                      <a:spcBef>
+                        <a:spcPts val="0"/>
+                      </a:spcBef>
+                      <a:spcAft>
+                        <a:spcPts val="0"/>
+                      </a:spcAft>
+                      <a:buClrTx/>
+                      <a:buSzTx/>
+                      <a:buFontTx/>
+                      <a:buNone/>
+                      <a:tabLst/>
+                      <a:defRPr/>
+                    </a:pPr>
+                    <a:endParaRPr kumimoji="0" lang="en-US" sz="1800" b="0" i="0" u="none" strike="noStrike" kern="0" cap="none" spc="0" normalizeH="0" baseline="0" noProof="0">
+                      <a:ln>
+                        <a:noFill/>
+                      </a:ln>
+                      <a:solidFill>
+                        <a:prstClr val="white"/>
+                      </a:solidFill>
+                      <a:effectLst/>
+                      <a:uLnTx/>
+                      <a:uFillTx/>
+                      <a:latin typeface="Corbel"/>
+                      <a:ea typeface="+mn-ea"/>
+                      <a:cs typeface="+mn-cs"/>
+                    </a:endParaRPr>
+                  </a:p>
+                </p:txBody>
+              </p:sp>
+            </p:grpSp>
+          </p:grpSp>
+          <p:grpSp>
+            <p:nvGrpSpPr>
+              <p:cNvPr id="19" name="Group 18">
+                <a:extLst>
+                  <a:ext uri="{FF2B5EF4-FFF2-40B4-BE49-F238E27FC236}">
+                    <a16:creationId xmlns:a16="http://schemas.microsoft.com/office/drawing/2014/main" id="{37BA1C62-11EE-FC49-A104-4E9B02CDB858}"/>
+                  </a:ext>
+                </a:extLst>
+              </p:cNvPr>
+              <p:cNvGrpSpPr/>
+              <p:nvPr/>
+            </p:nvGrpSpPr>
+            <p:grpSpPr>
+              <a:xfrm>
+                <a:off x="6319833" y="4444997"/>
+                <a:ext cx="2647161" cy="2060575"/>
+                <a:chOff x="-146052" y="4432299"/>
+                <a:chExt cx="2647161" cy="2060575"/>
+              </a:xfrm>
+            </p:grpSpPr>
+            <p:sp>
+              <p:nvSpPr>
+                <p:cNvPr id="31" name="Rectangle 30">
+                  <a:extLst>
+                    <a:ext uri="{FF2B5EF4-FFF2-40B4-BE49-F238E27FC236}">
+                      <a16:creationId xmlns:a16="http://schemas.microsoft.com/office/drawing/2014/main" id="{15EB536D-43BF-C94F-9CF7-4CBEC62EEB16}"/>
+                    </a:ext>
+                  </a:extLst>
+                </p:cNvPr>
+                <p:cNvSpPr/>
+                <p:nvPr/>
+              </p:nvSpPr>
+              <p:spPr>
+                <a:xfrm>
+                  <a:off x="-146052" y="4432299"/>
+                  <a:ext cx="2647161" cy="2060575"/>
+                </a:xfrm>
+                <a:prstGeom prst="rect">
+                  <a:avLst/>
+                </a:prstGeom>
+                <a:solidFill>
+                  <a:srgbClr val="30ACEC">
+                    <a:lumMod val="20000"/>
+                    <a:lumOff val="80000"/>
+                  </a:srgbClr>
+                </a:solidFill>
+                <a:ln w="15875" cap="rnd" cmpd="sng" algn="ctr">
+                  <a:solidFill>
+                    <a:srgbClr val="30ACEC">
+                      <a:shade val="50000"/>
+                    </a:srgbClr>
+                  </a:solidFill>
+                  <a:prstDash val="solid"/>
+                </a:ln>
+                <a:effectLst/>
+              </p:spPr>
+              <p:txBody>
+                <a:bodyPr rtlCol="0" anchor="t"/>
+                <a:lstStyle/>
+                <a:p>
+                  <a:pPr marL="0" marR="0" lvl="0" indent="0" defTabSz="914400" eaLnBrk="1" fontAlgn="auto" latinLnBrk="0" hangingPunct="1">
+                    <a:lnSpc>
+                      <a:spcPct val="100000"/>
+                    </a:lnSpc>
+                    <a:spcBef>
+                      <a:spcPts val="0"/>
+                    </a:spcBef>
+                    <a:spcAft>
+                      <a:spcPts val="0"/>
+                    </a:spcAft>
+                    <a:buClrTx/>
+                    <a:buSzTx/>
+                    <a:buFontTx/>
+                    <a:buNone/>
+                    <a:tabLst/>
+                    <a:defRPr/>
+                  </a:pPr>
+                  <a:r>
+                    <a:rPr kumimoji="0" lang="en-US" sz="1800" b="1" i="0" u="sng" strike="noStrike" kern="0" cap="none" spc="0" normalizeH="0" baseline="0" noProof="0" dirty="0">
+                      <a:ln>
+                        <a:noFill/>
+                      </a:ln>
+                      <a:solidFill>
+                        <a:prstClr val="black"/>
+                      </a:solidFill>
+                      <a:effectLst/>
+                      <a:uLnTx/>
+                      <a:uFillTx/>
+                      <a:latin typeface="Corbel"/>
+                      <a:ea typeface="+mn-ea"/>
+                      <a:cs typeface="+mn-cs"/>
+                    </a:rPr>
+                    <a:t>Component</a:t>
+                  </a:r>
+                </a:p>
+                <a:p>
+                  <a:pPr marL="0" marR="0" lvl="0" indent="0" defTabSz="914400" eaLnBrk="1" fontAlgn="auto" latinLnBrk="0" hangingPunct="1">
+                    <a:lnSpc>
+                      <a:spcPct val="100000"/>
+                    </a:lnSpc>
+                    <a:spcBef>
+                      <a:spcPts val="0"/>
+                    </a:spcBef>
+                    <a:spcAft>
+                      <a:spcPts val="0"/>
+                    </a:spcAft>
+                    <a:buClrTx/>
+                    <a:buSzTx/>
+                    <a:buFontTx/>
+                    <a:buNone/>
+                    <a:tabLst/>
+                    <a:defRPr/>
+                  </a:pPr>
+                  <a:r>
+                    <a:rPr kumimoji="0" lang="en-US" sz="1800" b="0" i="0" u="none" strike="noStrike" kern="0" cap="none" spc="0" normalizeH="0" baseline="0" noProof="0" dirty="0">
+                      <a:ln>
+                        <a:noFill/>
+                      </a:ln>
+                      <a:solidFill>
+                        <a:prstClr val="black"/>
+                      </a:solidFill>
+                      <a:effectLst/>
+                      <a:uLnTx/>
+                      <a:uFillTx/>
+                      <a:latin typeface="Corbel"/>
+                      <a:ea typeface="+mn-ea"/>
+                      <a:cs typeface="+mn-cs"/>
+                    </a:rPr>
+                    <a:t>identity: iGEM#B0015</a:t>
+                  </a:r>
+                </a:p>
+                <a:p>
+                  <a:pPr marL="0" marR="0" lvl="0" indent="0" defTabSz="914400" eaLnBrk="1" fontAlgn="auto" latinLnBrk="0" hangingPunct="1">
+                    <a:lnSpc>
+                      <a:spcPct val="100000"/>
+                    </a:lnSpc>
+                    <a:spcBef>
+                      <a:spcPts val="0"/>
+                    </a:spcBef>
+                    <a:spcAft>
+                      <a:spcPts val="0"/>
+                    </a:spcAft>
+                    <a:buClrTx/>
+                    <a:buSzTx/>
+                    <a:buFontTx/>
+                    <a:buNone/>
+                    <a:tabLst/>
+                    <a:defRPr/>
+                  </a:pPr>
+                  <a:r>
+                    <a:rPr kumimoji="0" lang="en-US" sz="1800" b="0" i="0" u="none" strike="noStrike" kern="0" cap="none" spc="0" normalizeH="0" baseline="0" noProof="0" dirty="0">
+                      <a:ln>
+                        <a:noFill/>
+                      </a:ln>
+                      <a:solidFill>
+                        <a:prstClr val="black"/>
+                      </a:solidFill>
+                      <a:effectLst/>
+                      <a:uLnTx/>
+                      <a:uFillTx/>
+                      <a:latin typeface="Corbel"/>
+                      <a:ea typeface="+mn-ea"/>
+                      <a:cs typeface="+mn-cs"/>
+                    </a:rPr>
+                    <a:t>name: double terminator</a:t>
+                  </a:r>
+                </a:p>
+                <a:p>
+                  <a:pPr marL="457200" lvl="0" indent="-457200"/>
+                  <a:r>
+                    <a:rPr kumimoji="0" lang="en-US" sz="1800" b="0" i="0" u="none" strike="noStrike" kern="0" cap="none" spc="0" normalizeH="0" baseline="0" noProof="0" dirty="0">
+                      <a:ln>
+                        <a:noFill/>
+                      </a:ln>
+                      <a:solidFill>
+                        <a:prstClr val="black"/>
+                      </a:solidFill>
+                      <a:effectLst/>
+                      <a:uLnTx/>
+                      <a:uFillTx/>
+                      <a:latin typeface="Corbel"/>
+                      <a:ea typeface="+mn-ea"/>
+                      <a:cs typeface="+mn-cs"/>
+                    </a:rPr>
+                    <a:t>type: </a:t>
+                  </a:r>
+                  <a:r>
+                    <a:rPr lang="en-US" kern="0" dirty="0">
+                      <a:solidFill>
+                        <a:prstClr val="black"/>
+                      </a:solidFill>
+                      <a:latin typeface="Corbel"/>
+                    </a:rPr>
+                    <a:t>SBO: DNA</a:t>
+                  </a:r>
+                  <a:endParaRPr kumimoji="0" lang="en-US" sz="1800" b="0" i="0" u="none" strike="noStrike" kern="0" cap="none" spc="0" normalizeH="0" baseline="0" noProof="0" dirty="0">
+                    <a:ln>
+                      <a:noFill/>
+                    </a:ln>
+                    <a:solidFill>
+                      <a:prstClr val="black"/>
+                    </a:solidFill>
+                    <a:effectLst/>
+                    <a:uLnTx/>
+                    <a:uFillTx/>
+                    <a:latin typeface="Corbel"/>
+                    <a:ea typeface="+mn-ea"/>
+                    <a:cs typeface="+mn-cs"/>
+                  </a:endParaRPr>
+                </a:p>
+                <a:p>
+                  <a:pPr marL="457200" marR="0" lvl="0" indent="-457200" defTabSz="914400" eaLnBrk="1" fontAlgn="auto" latinLnBrk="0" hangingPunct="1">
+                    <a:lnSpc>
+                      <a:spcPct val="100000"/>
+                    </a:lnSpc>
+                    <a:spcBef>
+                      <a:spcPts val="0"/>
+                    </a:spcBef>
+                    <a:spcAft>
+                      <a:spcPts val="0"/>
+                    </a:spcAft>
+                    <a:buClrTx/>
+                    <a:buSzTx/>
+                    <a:buFontTx/>
+                    <a:buNone/>
+                    <a:tabLst/>
+                    <a:defRPr/>
+                  </a:pPr>
+                  <a:r>
+                    <a:rPr kumimoji="0" lang="en-US" sz="1800" b="0" i="0" u="none" strike="noStrike" kern="0" cap="none" spc="0" normalizeH="0" baseline="0" noProof="0" dirty="0">
+                      <a:ln>
+                        <a:noFill/>
+                      </a:ln>
+                      <a:solidFill>
+                        <a:prstClr val="black"/>
+                      </a:solidFill>
+                      <a:effectLst/>
+                      <a:uLnTx/>
+                      <a:uFillTx/>
+                      <a:latin typeface="Corbel"/>
+                      <a:ea typeface="+mn-ea"/>
+                      <a:cs typeface="+mn-cs"/>
+                    </a:rPr>
+                    <a:t>role: SO: Terminator</a:t>
+                  </a:r>
+                </a:p>
+                <a:p>
+                  <a:pPr marL="457200" marR="0" lvl="0" indent="-457200" defTabSz="914400" eaLnBrk="1" fontAlgn="auto" latinLnBrk="0" hangingPunct="1">
+                    <a:lnSpc>
+                      <a:spcPct val="100000"/>
+                    </a:lnSpc>
+                    <a:spcBef>
+                      <a:spcPts val="0"/>
+                    </a:spcBef>
+                    <a:spcAft>
+                      <a:spcPts val="0"/>
+                    </a:spcAft>
+                    <a:buClrTx/>
+                    <a:buSzTx/>
+                    <a:buFontTx/>
+                    <a:buNone/>
+                    <a:tabLst/>
+                    <a:defRPr/>
+                  </a:pPr>
+                  <a:endParaRPr kumimoji="0" lang="en-US" sz="1800" b="0" i="0" u="none" strike="noStrike" kern="0" cap="none" spc="0" normalizeH="0" baseline="0" noProof="0" dirty="0">
+                    <a:ln>
+                      <a:noFill/>
+                    </a:ln>
+                    <a:solidFill>
+                      <a:prstClr val="black"/>
+                    </a:solidFill>
+                    <a:effectLst/>
+                    <a:uLnTx/>
+                    <a:uFillTx/>
+                    <a:latin typeface="Corbel"/>
+                    <a:ea typeface="+mn-ea"/>
+                    <a:cs typeface="+mn-cs"/>
+                  </a:endParaRPr>
+                </a:p>
+              </p:txBody>
+            </p:sp>
+            <p:grpSp>
+              <p:nvGrpSpPr>
+                <p:cNvPr id="32" name="Group 31">
+                  <a:extLst>
+                    <a:ext uri="{FF2B5EF4-FFF2-40B4-BE49-F238E27FC236}">
+                      <a16:creationId xmlns:a16="http://schemas.microsoft.com/office/drawing/2014/main" id="{6D27D017-1D02-DC4D-A921-1E073B70105C}"/>
+                    </a:ext>
+                  </a:extLst>
+                </p:cNvPr>
+                <p:cNvGrpSpPr/>
+                <p:nvPr/>
+              </p:nvGrpSpPr>
+              <p:grpSpPr>
+                <a:xfrm>
+                  <a:off x="910439" y="6099172"/>
+                  <a:ext cx="558800" cy="349250"/>
+                  <a:chOff x="3625066" y="5219699"/>
+                  <a:chExt cx="558800" cy="349250"/>
+                </a:xfrm>
+              </p:grpSpPr>
+              <p:cxnSp>
+                <p:nvCxnSpPr>
+                  <p:cNvPr id="33" name="Straight Connector 32">
+                    <a:extLst>
+                      <a:ext uri="{FF2B5EF4-FFF2-40B4-BE49-F238E27FC236}">
+                        <a16:creationId xmlns:a16="http://schemas.microsoft.com/office/drawing/2014/main" id="{1BA81184-7578-5144-B3EC-5A5F675774E4}"/>
+                      </a:ext>
+                    </a:extLst>
+                  </p:cNvPr>
+                  <p:cNvCxnSpPr/>
+                  <p:nvPr/>
+                </p:nvCxnSpPr>
+                <p:spPr>
+                  <a:xfrm>
+                    <a:off x="3625066" y="5568949"/>
+                    <a:ext cx="558800" cy="0"/>
+                  </a:xfrm>
+                  <a:prstGeom prst="line">
+                    <a:avLst/>
+                  </a:prstGeom>
+                  <a:noFill/>
+                  <a:ln w="38100" cap="rnd" cmpd="sng" algn="ctr">
+                    <a:solidFill>
+                      <a:sysClr val="windowText" lastClr="000000"/>
+                    </a:solidFill>
+                    <a:prstDash val="solid"/>
+                  </a:ln>
+                  <a:effectLst/>
+                </p:spPr>
+              </p:cxnSp>
+              <p:sp>
+                <p:nvSpPr>
+                  <p:cNvPr id="34" name="Left-Right-Up Arrow 33">
+                    <a:extLst>
+                      <a:ext uri="{FF2B5EF4-FFF2-40B4-BE49-F238E27FC236}">
+                        <a16:creationId xmlns:a16="http://schemas.microsoft.com/office/drawing/2014/main" id="{EAE964E7-A3D1-FA42-AB1B-CACF63D010D1}"/>
+                      </a:ext>
+                    </a:extLst>
+                  </p:cNvPr>
+                  <p:cNvSpPr/>
+                  <p:nvPr/>
+                </p:nvSpPr>
+                <p:spPr>
+                  <a:xfrm rot="10800000">
+                    <a:off x="3734599" y="5219699"/>
+                    <a:ext cx="311150" cy="330200"/>
+                  </a:xfrm>
+                  <a:prstGeom prst="leftRightUpArrow">
+                    <a:avLst>
+                      <a:gd name="adj1" fmla="val 18220"/>
+                      <a:gd name="adj2" fmla="val 8051"/>
+                      <a:gd name="adj3" fmla="val 0"/>
+                    </a:avLst>
+                  </a:prstGeom>
+                  <a:solidFill>
+                    <a:srgbClr val="D64787"/>
+                  </a:solidFill>
+                  <a:ln w="15875" cap="rnd" cmpd="sng" algn="ctr">
+                    <a:solidFill>
+                      <a:srgbClr val="D64787">
+                        <a:lumMod val="75000"/>
+                      </a:srgbClr>
+                    </a:solidFill>
+                    <a:prstDash val="solid"/>
+                  </a:ln>
+                  <a:effectLst/>
+                </p:spPr>
+                <p:txBody>
+                  <a:bodyPr rtlCol="0" anchor="ctr"/>
+                  <a:lstStyle/>
+                  <a:p>
+                    <a:pPr marL="0" marR="0" lvl="0" indent="0" algn="ctr" defTabSz="914400" eaLnBrk="1" fontAlgn="auto" latinLnBrk="0" hangingPunct="1">
+                      <a:lnSpc>
+                        <a:spcPct val="100000"/>
+                      </a:lnSpc>
+                      <a:spcBef>
+                        <a:spcPts val="0"/>
+                      </a:spcBef>
+                      <a:spcAft>
+                        <a:spcPts val="0"/>
+                      </a:spcAft>
+                      <a:buClrTx/>
+                      <a:buSzTx/>
+                      <a:buFontTx/>
+                      <a:buNone/>
+                      <a:tabLst/>
+                      <a:defRPr/>
+                    </a:pPr>
+                    <a:endParaRPr kumimoji="0" lang="en-US" sz="1800" b="0" i="0" u="none" strike="noStrike" kern="0" cap="none" spc="0" normalizeH="0" baseline="0" noProof="0">
+                      <a:ln>
+                        <a:noFill/>
+                      </a:ln>
+                      <a:solidFill>
+                        <a:prstClr val="white"/>
+                      </a:solidFill>
+                      <a:effectLst/>
+                      <a:uLnTx/>
+                      <a:uFillTx/>
+                      <a:latin typeface="Corbel"/>
+                      <a:ea typeface="+mn-ea"/>
+                      <a:cs typeface="+mn-cs"/>
+                    </a:endParaRPr>
+                  </a:p>
+                </p:txBody>
+              </p:sp>
+            </p:grpSp>
+          </p:grpSp>
+          <p:grpSp>
+            <p:nvGrpSpPr>
+              <p:cNvPr id="20" name="Group 19">
+                <a:extLst>
+                  <a:ext uri="{FF2B5EF4-FFF2-40B4-BE49-F238E27FC236}">
+                    <a16:creationId xmlns:a16="http://schemas.microsoft.com/office/drawing/2014/main" id="{5FD63FBB-A30D-0D48-8343-283F330920D6}"/>
+                  </a:ext>
+                </a:extLst>
+              </p:cNvPr>
+              <p:cNvGrpSpPr/>
+              <p:nvPr/>
+            </p:nvGrpSpPr>
+            <p:grpSpPr>
+              <a:xfrm>
+                <a:off x="3259138" y="4444998"/>
+                <a:ext cx="2727325" cy="2060575"/>
+                <a:chOff x="3856034" y="4190998"/>
+                <a:chExt cx="2727325" cy="2060575"/>
+              </a:xfrm>
+            </p:grpSpPr>
+            <p:sp>
+              <p:nvSpPr>
+                <p:cNvPr id="27" name="Rectangle 26">
+                  <a:extLst>
+                    <a:ext uri="{FF2B5EF4-FFF2-40B4-BE49-F238E27FC236}">
+                      <a16:creationId xmlns:a16="http://schemas.microsoft.com/office/drawing/2014/main" id="{30EF32B7-C12B-F048-B945-106782541762}"/>
+                    </a:ext>
+                  </a:extLst>
+                </p:cNvPr>
+                <p:cNvSpPr/>
+                <p:nvPr/>
+              </p:nvSpPr>
+              <p:spPr>
+                <a:xfrm>
+                  <a:off x="3856034" y="4190998"/>
+                  <a:ext cx="2727325" cy="2060575"/>
+                </a:xfrm>
+                <a:prstGeom prst="rect">
+                  <a:avLst/>
+                </a:prstGeom>
+                <a:solidFill>
+                  <a:srgbClr val="30ACEC">
+                    <a:lumMod val="20000"/>
+                    <a:lumOff val="80000"/>
+                  </a:srgbClr>
+                </a:solidFill>
+                <a:ln w="15875" cap="rnd" cmpd="sng" algn="ctr">
+                  <a:solidFill>
+                    <a:srgbClr val="30ACEC">
+                      <a:shade val="50000"/>
+                    </a:srgbClr>
+                  </a:solidFill>
+                  <a:prstDash val="solid"/>
+                </a:ln>
+                <a:effectLst/>
+              </p:spPr>
+              <p:txBody>
+                <a:bodyPr rtlCol="0" anchor="t"/>
+                <a:lstStyle/>
+                <a:p>
+                  <a:pPr marL="0" marR="0" lvl="0" indent="0" defTabSz="914400" eaLnBrk="1" fontAlgn="auto" latinLnBrk="0" hangingPunct="1">
+                    <a:lnSpc>
+                      <a:spcPct val="100000"/>
+                    </a:lnSpc>
+                    <a:spcBef>
+                      <a:spcPts val="0"/>
+                    </a:spcBef>
+                    <a:spcAft>
+                      <a:spcPts val="0"/>
+                    </a:spcAft>
+                    <a:buClrTx/>
+                    <a:buSzTx/>
+                    <a:buFontTx/>
+                    <a:buNone/>
+                    <a:tabLst/>
+                    <a:defRPr/>
+                  </a:pPr>
+                  <a:r>
+                    <a:rPr kumimoji="0" lang="en-US" sz="1800" b="1" i="0" u="sng" strike="noStrike" kern="0" cap="none" spc="0" normalizeH="0" baseline="0" noProof="0" dirty="0">
+                      <a:ln>
+                        <a:noFill/>
+                      </a:ln>
+                      <a:solidFill>
+                        <a:prstClr val="black"/>
+                      </a:solidFill>
+                      <a:effectLst/>
+                      <a:uLnTx/>
+                      <a:uFillTx/>
+                      <a:latin typeface="Corbel"/>
+                      <a:ea typeface="+mn-ea"/>
+                      <a:cs typeface="+mn-cs"/>
+                    </a:rPr>
+                    <a:t>Component</a:t>
+                  </a:r>
+                </a:p>
+                <a:p>
+                  <a:pPr marL="0" marR="0" lvl="0" indent="0" defTabSz="914400" eaLnBrk="1" fontAlgn="auto" latinLnBrk="0" hangingPunct="1">
+                    <a:lnSpc>
+                      <a:spcPct val="100000"/>
+                    </a:lnSpc>
+                    <a:spcBef>
+                      <a:spcPts val="0"/>
+                    </a:spcBef>
+                    <a:spcAft>
+                      <a:spcPts val="0"/>
+                    </a:spcAft>
+                    <a:buClrTx/>
+                    <a:buSzTx/>
+                    <a:buFontTx/>
+                    <a:buNone/>
+                    <a:tabLst/>
+                    <a:defRPr/>
+                  </a:pPr>
+                  <a:r>
+                    <a:rPr kumimoji="0" lang="en-US" sz="1800" b="0" i="0" u="none" strike="noStrike" kern="0" cap="none" spc="0" normalizeH="0" baseline="0" noProof="0" dirty="0">
+                      <a:ln>
+                        <a:noFill/>
+                      </a:ln>
+                      <a:solidFill>
+                        <a:prstClr val="black"/>
+                      </a:solidFill>
+                      <a:effectLst/>
+                      <a:uLnTx/>
+                      <a:uFillTx/>
+                      <a:latin typeface="Corbel"/>
+                      <a:ea typeface="+mn-ea"/>
+                      <a:cs typeface="+mn-cs"/>
+                    </a:rPr>
+                    <a:t>identity: iGEM#E0040</a:t>
+                  </a:r>
+                </a:p>
+                <a:p>
+                  <a:pPr marL="0" marR="0" lvl="0" indent="0" defTabSz="914400" eaLnBrk="1" fontAlgn="auto" latinLnBrk="0" hangingPunct="1">
+                    <a:lnSpc>
+                      <a:spcPct val="100000"/>
+                    </a:lnSpc>
+                    <a:spcBef>
+                      <a:spcPts val="0"/>
+                    </a:spcBef>
+                    <a:spcAft>
+                      <a:spcPts val="0"/>
+                    </a:spcAft>
+                    <a:buClrTx/>
+                    <a:buSzTx/>
+                    <a:buFontTx/>
+                    <a:buNone/>
+                    <a:tabLst/>
+                    <a:defRPr/>
+                  </a:pPr>
+                  <a:r>
+                    <a:rPr kumimoji="0" lang="en-US" sz="1800" b="0" i="0" u="none" strike="noStrike" kern="0" cap="none" spc="0" normalizeH="0" baseline="0" noProof="0" dirty="0">
+                      <a:ln>
+                        <a:noFill/>
+                      </a:ln>
+                      <a:solidFill>
+                        <a:prstClr val="black"/>
+                      </a:solidFill>
+                      <a:effectLst/>
+                      <a:uLnTx/>
+                      <a:uFillTx/>
+                      <a:latin typeface="Corbel"/>
+                      <a:ea typeface="+mn-ea"/>
+                      <a:cs typeface="+mn-cs"/>
+                    </a:rPr>
+                    <a:t>name: GFP</a:t>
+                  </a:r>
+                </a:p>
+                <a:p>
+                  <a:pPr marL="457200" lvl="0" indent="-457200"/>
+                  <a:r>
+                    <a:rPr kumimoji="0" lang="en-US" sz="1800" b="0" i="0" u="none" strike="noStrike" kern="0" cap="none" spc="0" normalizeH="0" baseline="0" noProof="0" dirty="0">
+                      <a:ln>
+                        <a:noFill/>
+                      </a:ln>
+                      <a:solidFill>
+                        <a:prstClr val="black"/>
+                      </a:solidFill>
+                      <a:effectLst/>
+                      <a:uLnTx/>
+                      <a:uFillTx/>
+                      <a:latin typeface="Corbel"/>
+                      <a:ea typeface="+mn-ea"/>
+                      <a:cs typeface="+mn-cs"/>
+                    </a:rPr>
+                    <a:t>type: </a:t>
+                  </a:r>
+                  <a:r>
+                    <a:rPr lang="en-US" kern="0" dirty="0">
+                      <a:solidFill>
+                        <a:prstClr val="black"/>
+                      </a:solidFill>
+                      <a:latin typeface="Corbel"/>
+                    </a:rPr>
+                    <a:t>SBO: DNA</a:t>
+                  </a:r>
+                  <a:endParaRPr kumimoji="0" lang="en-US" sz="1800" b="0" i="0" u="none" strike="noStrike" kern="0" cap="none" spc="0" normalizeH="0" baseline="0" noProof="0" dirty="0">
+                    <a:ln>
+                      <a:noFill/>
+                    </a:ln>
+                    <a:solidFill>
+                      <a:prstClr val="black"/>
+                    </a:solidFill>
+                    <a:effectLst/>
+                    <a:uLnTx/>
+                    <a:uFillTx/>
+                    <a:latin typeface="Corbel"/>
+                    <a:ea typeface="+mn-ea"/>
+                    <a:cs typeface="+mn-cs"/>
+                  </a:endParaRPr>
+                </a:p>
+                <a:p>
+                  <a:pPr marL="457200" marR="0" lvl="0" indent="-457200" defTabSz="914400" eaLnBrk="1" fontAlgn="auto" latinLnBrk="0" hangingPunct="1">
+                    <a:lnSpc>
+                      <a:spcPct val="100000"/>
+                    </a:lnSpc>
+                    <a:spcBef>
+                      <a:spcPts val="0"/>
+                    </a:spcBef>
+                    <a:spcAft>
+                      <a:spcPts val="0"/>
+                    </a:spcAft>
+                    <a:buClrTx/>
+                    <a:buSzTx/>
+                    <a:buFontTx/>
+                    <a:buNone/>
+                    <a:tabLst/>
+                    <a:defRPr/>
+                  </a:pPr>
+                  <a:r>
+                    <a:rPr kumimoji="0" lang="en-US" sz="1800" b="0" i="0" u="none" strike="noStrike" kern="0" cap="none" spc="0" normalizeH="0" baseline="0" noProof="0" dirty="0">
+                      <a:ln>
+                        <a:noFill/>
+                      </a:ln>
+                      <a:solidFill>
+                        <a:prstClr val="black"/>
+                      </a:solidFill>
+                      <a:effectLst/>
+                      <a:uLnTx/>
+                      <a:uFillTx/>
+                      <a:latin typeface="Corbel"/>
+                      <a:ea typeface="+mn-ea"/>
+                      <a:cs typeface="+mn-cs"/>
+                    </a:rPr>
+                    <a:t>role: SO: CDS</a:t>
+                  </a:r>
+                </a:p>
+                <a:p>
+                  <a:pPr marL="457200" marR="0" lvl="0" indent="-457200" defTabSz="914400" eaLnBrk="1" fontAlgn="auto" latinLnBrk="0" hangingPunct="1">
+                    <a:lnSpc>
+                      <a:spcPct val="100000"/>
+                    </a:lnSpc>
+                    <a:spcBef>
+                      <a:spcPts val="0"/>
+                    </a:spcBef>
+                    <a:spcAft>
+                      <a:spcPts val="0"/>
+                    </a:spcAft>
+                    <a:buClrTx/>
+                    <a:buSzTx/>
+                    <a:buFontTx/>
+                    <a:buNone/>
+                    <a:tabLst/>
+                    <a:defRPr/>
+                  </a:pPr>
+                  <a:endParaRPr kumimoji="0" lang="en-US" sz="1800" b="0" i="0" u="none" strike="noStrike" kern="0" cap="none" spc="0" normalizeH="0" baseline="0" noProof="0" dirty="0">
+                    <a:ln>
+                      <a:noFill/>
+                    </a:ln>
+                    <a:solidFill>
+                      <a:prstClr val="black"/>
+                    </a:solidFill>
+                    <a:effectLst/>
+                    <a:uLnTx/>
+                    <a:uFillTx/>
+                    <a:latin typeface="Corbel"/>
+                    <a:ea typeface="+mn-ea"/>
+                    <a:cs typeface="+mn-cs"/>
+                  </a:endParaRPr>
+                </a:p>
+              </p:txBody>
+            </p:sp>
+            <p:grpSp>
+              <p:nvGrpSpPr>
+                <p:cNvPr id="28" name="Group 27">
+                  <a:extLst>
+                    <a:ext uri="{FF2B5EF4-FFF2-40B4-BE49-F238E27FC236}">
+                      <a16:creationId xmlns:a16="http://schemas.microsoft.com/office/drawing/2014/main" id="{9867747C-A4D2-FE42-81BB-5D15A50ACD71}"/>
+                    </a:ext>
+                  </a:extLst>
+                </p:cNvPr>
+                <p:cNvGrpSpPr/>
+                <p:nvPr/>
+              </p:nvGrpSpPr>
+              <p:grpSpPr>
+                <a:xfrm>
+                  <a:off x="4692649" y="5967357"/>
+                  <a:ext cx="993775" cy="228600"/>
+                  <a:chOff x="7407276" y="5087884"/>
+                  <a:chExt cx="993775" cy="228600"/>
+                </a:xfrm>
+              </p:grpSpPr>
+              <p:cxnSp>
+                <p:nvCxnSpPr>
+                  <p:cNvPr id="29" name="Straight Connector 28">
+                    <a:extLst>
+                      <a:ext uri="{FF2B5EF4-FFF2-40B4-BE49-F238E27FC236}">
+                        <a16:creationId xmlns:a16="http://schemas.microsoft.com/office/drawing/2014/main" id="{42663CDB-C061-7D44-BC75-032D10715226}"/>
+                      </a:ext>
+                    </a:extLst>
+                  </p:cNvPr>
+                  <p:cNvCxnSpPr/>
+                  <p:nvPr/>
+                </p:nvCxnSpPr>
+                <p:spPr>
+                  <a:xfrm>
+                    <a:off x="7407276" y="5205250"/>
+                    <a:ext cx="993775" cy="0"/>
+                  </a:xfrm>
+                  <a:prstGeom prst="line">
+                    <a:avLst/>
+                  </a:prstGeom>
+                  <a:noFill/>
+                  <a:ln w="38100" cap="rnd" cmpd="sng" algn="ctr">
+                    <a:solidFill>
+                      <a:sysClr val="windowText" lastClr="000000"/>
+                    </a:solidFill>
+                    <a:prstDash val="solid"/>
+                  </a:ln>
+                  <a:effectLst/>
+                </p:spPr>
+              </p:cxnSp>
+              <p:sp>
+                <p:nvSpPr>
+                  <p:cNvPr id="30" name="Pentagon 29">
+                    <a:extLst>
+                      <a:ext uri="{FF2B5EF4-FFF2-40B4-BE49-F238E27FC236}">
+                        <a16:creationId xmlns:a16="http://schemas.microsoft.com/office/drawing/2014/main" id="{25915AFB-E7C7-4546-A82D-3186FE073827}"/>
+                      </a:ext>
+                    </a:extLst>
+                  </p:cNvPr>
+                  <p:cNvSpPr/>
+                  <p:nvPr/>
+                </p:nvSpPr>
+                <p:spPr>
+                  <a:xfrm>
+                    <a:off x="7559676" y="5087884"/>
+                    <a:ext cx="742950" cy="228600"/>
+                  </a:xfrm>
+                  <a:prstGeom prst="homePlate">
+                    <a:avLst/>
+                  </a:prstGeom>
+                  <a:solidFill>
+                    <a:srgbClr val="80C34F"/>
+                  </a:solidFill>
+                  <a:ln w="15875" cap="rnd" cmpd="sng" algn="ctr">
+                    <a:solidFill>
+                      <a:srgbClr val="80C34F">
+                        <a:lumMod val="75000"/>
+                      </a:srgbClr>
+                    </a:solidFill>
+                    <a:prstDash val="solid"/>
+                  </a:ln>
+                  <a:effectLst/>
+                </p:spPr>
+                <p:txBody>
+                  <a:bodyPr rtlCol="0" anchor="ctr"/>
+                  <a:lstStyle/>
+                  <a:p>
+                    <a:pPr marL="0" marR="0" lvl="0" indent="0" algn="ctr" defTabSz="914400" eaLnBrk="1" fontAlgn="auto" latinLnBrk="0" hangingPunct="1">
+                      <a:lnSpc>
+                        <a:spcPct val="100000"/>
+                      </a:lnSpc>
+                      <a:spcBef>
+                        <a:spcPts val="0"/>
+                      </a:spcBef>
+                      <a:spcAft>
+                        <a:spcPts val="0"/>
+                      </a:spcAft>
+                      <a:buClrTx/>
+                      <a:buSzTx/>
+                      <a:buFontTx/>
+                      <a:buNone/>
+                      <a:tabLst/>
+                      <a:defRPr/>
+                    </a:pPr>
+                    <a:endParaRPr kumimoji="0" lang="en-US" sz="1800" b="0" i="0" u="none" strike="noStrike" kern="0" cap="none" spc="0" normalizeH="0" baseline="0" noProof="0">
+                      <a:ln>
+                        <a:noFill/>
+                      </a:ln>
+                      <a:solidFill>
+                        <a:prstClr val="white"/>
+                      </a:solidFill>
+                      <a:effectLst/>
+                      <a:uLnTx/>
+                      <a:uFillTx/>
+                      <a:latin typeface="Corbel"/>
+                      <a:ea typeface="+mn-ea"/>
+                      <a:cs typeface="+mn-cs"/>
+                    </a:endParaRPr>
+                  </a:p>
+                </p:txBody>
+              </p:sp>
+            </p:grpSp>
+          </p:grpSp>
+          <p:cxnSp>
+            <p:nvCxnSpPr>
+              <p:cNvPr id="21" name="Straight Arrow Connector 54">
+                <a:extLst>
+                  <a:ext uri="{FF2B5EF4-FFF2-40B4-BE49-F238E27FC236}">
+                    <a16:creationId xmlns:a16="http://schemas.microsoft.com/office/drawing/2014/main" id="{76A268D4-9C87-6145-BA9F-8E441F8EE7C9}"/>
+                  </a:ext>
+                </a:extLst>
+              </p:cNvPr>
+              <p:cNvCxnSpPr>
+                <a:cxnSpLocks/>
+                <a:stCxn id="41" idx="2"/>
+                <a:endCxn id="31" idx="0"/>
+              </p:cNvCxnSpPr>
+              <p:nvPr/>
+            </p:nvCxnSpPr>
+            <p:spPr>
+              <a:xfrm rot="16200000" flipH="1">
+                <a:off x="7100688" y="3902271"/>
+                <a:ext cx="392308" cy="693144"/>
+              </a:xfrm>
+              <a:prstGeom prst="bentConnector3">
+                <a:avLst>
+                  <a:gd name="adj1" fmla="val 50000"/>
+                </a:avLst>
+              </a:prstGeom>
+              <a:noFill/>
+              <a:ln w="38100" cap="rnd" cmpd="sng" algn="ctr">
+                <a:solidFill>
+                  <a:srgbClr val="30ACEC">
+                    <a:lumMod val="75000"/>
+                  </a:srgbClr>
+                </a:solidFill>
+                <a:prstDash val="solid"/>
+                <a:tailEnd type="triangle"/>
+              </a:ln>
+              <a:effectLst/>
+            </p:spPr>
+          </p:cxnSp>
+          <p:cxnSp>
+            <p:nvCxnSpPr>
+              <p:cNvPr id="22" name="Straight Arrow Connector 54">
+                <a:extLst>
+                  <a:ext uri="{FF2B5EF4-FFF2-40B4-BE49-F238E27FC236}">
+                    <a16:creationId xmlns:a16="http://schemas.microsoft.com/office/drawing/2014/main" id="{6DD8ABC7-6C8A-B043-8580-BDC746BD2707}"/>
+                  </a:ext>
+                </a:extLst>
+              </p:cNvPr>
+              <p:cNvCxnSpPr>
+                <a:cxnSpLocks/>
+                <a:stCxn id="42" idx="2"/>
+                <a:endCxn id="27" idx="0"/>
+              </p:cNvCxnSpPr>
+              <p:nvPr/>
+            </p:nvCxnSpPr>
+            <p:spPr>
+              <a:xfrm rot="16200000" flipH="1">
+                <a:off x="4425156" y="4247352"/>
+                <a:ext cx="392309" cy="2981"/>
+              </a:xfrm>
+              <a:prstGeom prst="bentConnector3">
+                <a:avLst>
+                  <a:gd name="adj1" fmla="val 50000"/>
+                </a:avLst>
+              </a:prstGeom>
+              <a:noFill/>
+              <a:ln w="38100" cap="rnd" cmpd="sng" algn="ctr">
+                <a:solidFill>
+                  <a:srgbClr val="30ACEC">
+                    <a:lumMod val="75000"/>
+                  </a:srgbClr>
+                </a:solidFill>
+                <a:prstDash val="solid"/>
+                <a:tailEnd type="triangle"/>
+              </a:ln>
+              <a:effectLst/>
+            </p:spPr>
+          </p:cxnSp>
+          <p:cxnSp>
+            <p:nvCxnSpPr>
+              <p:cNvPr id="23" name="Straight Arrow Connector 54">
+                <a:extLst>
+                  <a:ext uri="{FF2B5EF4-FFF2-40B4-BE49-F238E27FC236}">
+                    <a16:creationId xmlns:a16="http://schemas.microsoft.com/office/drawing/2014/main" id="{A9C1A8D9-0D92-D54F-A453-98C613E698F6}"/>
+                  </a:ext>
+                </a:extLst>
+              </p:cNvPr>
+              <p:cNvCxnSpPr>
+                <a:cxnSpLocks/>
+                <a:stCxn id="40" idx="2"/>
+                <a:endCxn id="35" idx="0"/>
+              </p:cNvCxnSpPr>
+              <p:nvPr/>
+            </p:nvCxnSpPr>
+            <p:spPr>
+              <a:xfrm rot="5400000">
+                <a:off x="1766094" y="3870921"/>
+                <a:ext cx="392309" cy="755844"/>
+              </a:xfrm>
+              <a:prstGeom prst="bentConnector3">
+                <a:avLst>
+                  <a:gd name="adj1" fmla="val 50000"/>
+                </a:avLst>
+              </a:prstGeom>
+              <a:noFill/>
+              <a:ln w="38100" cap="rnd" cmpd="sng" algn="ctr">
+                <a:solidFill>
+                  <a:srgbClr val="30ACEC">
+                    <a:lumMod val="75000"/>
+                  </a:srgbClr>
+                </a:solidFill>
+                <a:prstDash val="solid"/>
+                <a:tailEnd type="triangle"/>
+              </a:ln>
+              <a:effectLst/>
+            </p:spPr>
+          </p:cxnSp>
+          <p:sp>
+            <p:nvSpPr>
+              <p:cNvPr id="24" name="TextBox 23">
+                <a:extLst>
+                  <a:ext uri="{FF2B5EF4-FFF2-40B4-BE49-F238E27FC236}">
+                    <a16:creationId xmlns:a16="http://schemas.microsoft.com/office/drawing/2014/main" id="{68F6289A-ED7A-6941-9D89-2D698B6936BF}"/>
+                  </a:ext>
+                </a:extLst>
+              </p:cNvPr>
+              <p:cNvSpPr txBox="1"/>
+              <p:nvPr/>
+            </p:nvSpPr>
+            <p:spPr>
+              <a:xfrm>
+                <a:off x="2316157" y="3974951"/>
+                <a:ext cx="995785" cy="307777"/>
+              </a:xfrm>
+              <a:prstGeom prst="rect">
+                <a:avLst/>
+              </a:prstGeom>
+              <a:noFill/>
+              <a:ln>
+                <a:noFill/>
+              </a:ln>
+            </p:spPr>
+            <p:txBody>
+              <a:bodyPr wrap="none" rtlCol="0">
+                <a:spAutoFit/>
+              </a:bodyPr>
+              <a:lstStyle/>
+              <a:p>
+                <a:pPr marL="0" marR="0" lvl="0" indent="0" defTabSz="914400" eaLnBrk="1" fontAlgn="auto" latinLnBrk="0" hangingPunct="1">
+                  <a:lnSpc>
+                    <a:spcPct val="100000"/>
+                  </a:lnSpc>
+                  <a:spcBef>
+                    <a:spcPts val="0"/>
+                  </a:spcBef>
+                  <a:spcAft>
+                    <a:spcPts val="0"/>
+                  </a:spcAft>
+                  <a:buClrTx/>
+                  <a:buSzTx/>
+                  <a:buFontTx/>
+                  <a:buNone/>
+                  <a:tabLst/>
+                  <a:defRPr/>
+                </a:pPr>
+                <a:r>
+                  <a:rPr kumimoji="0" lang="en-US" sz="1400" b="0" i="0" u="none" strike="noStrike" kern="0" cap="none" spc="0" normalizeH="0" baseline="0" noProof="0" dirty="0" err="1">
+                    <a:ln>
+                      <a:noFill/>
+                    </a:ln>
+                    <a:solidFill>
+                      <a:srgbClr val="30ACEC">
+                        <a:lumMod val="75000"/>
+                      </a:srgbClr>
+                    </a:solidFill>
+                    <a:effectLst/>
+                    <a:uLnTx/>
+                    <a:uFillTx/>
+                    <a:latin typeface="Corbel"/>
+                  </a:rPr>
+                  <a:t>instanceOf</a:t>
+                </a:r>
+                <a:endParaRPr kumimoji="0" lang="en-US" sz="1400" b="0" i="0" u="none" strike="noStrike" kern="0" cap="none" spc="0" normalizeH="0" baseline="0" noProof="0" dirty="0">
+                  <a:ln>
+                    <a:noFill/>
+                  </a:ln>
+                  <a:solidFill>
+                    <a:srgbClr val="30ACEC">
+                      <a:lumMod val="75000"/>
+                    </a:srgbClr>
+                  </a:solidFill>
+                  <a:effectLst/>
+                  <a:uLnTx/>
+                  <a:uFillTx/>
+                  <a:latin typeface="Corbel"/>
+                </a:endParaRPr>
+              </a:p>
+            </p:txBody>
+          </p:sp>
+          <p:sp>
+            <p:nvSpPr>
+              <p:cNvPr id="25" name="TextBox 24">
+                <a:extLst>
+                  <a:ext uri="{FF2B5EF4-FFF2-40B4-BE49-F238E27FC236}">
+                    <a16:creationId xmlns:a16="http://schemas.microsoft.com/office/drawing/2014/main" id="{4FB03FF1-924E-CB45-8C6A-2751301973A5}"/>
+                  </a:ext>
+                </a:extLst>
+              </p:cNvPr>
+              <p:cNvSpPr txBox="1"/>
+              <p:nvPr/>
+            </p:nvSpPr>
+            <p:spPr>
+              <a:xfrm>
+                <a:off x="4577305" y="3998963"/>
+                <a:ext cx="995785" cy="307777"/>
+              </a:xfrm>
+              <a:prstGeom prst="rect">
+                <a:avLst/>
+              </a:prstGeom>
+              <a:noFill/>
+              <a:ln>
+                <a:noFill/>
+              </a:ln>
+            </p:spPr>
+            <p:txBody>
+              <a:bodyPr wrap="none" rtlCol="0">
+                <a:spAutoFit/>
+              </a:bodyPr>
+              <a:lstStyle/>
+              <a:p>
+                <a:pPr lvl="0">
+                  <a:defRPr/>
+                </a:pPr>
+                <a:r>
+                  <a:rPr lang="en-US" sz="1400" kern="0" dirty="0" err="1">
+                    <a:solidFill>
+                      <a:srgbClr val="30ACEC">
+                        <a:lumMod val="75000"/>
+                      </a:srgbClr>
+                    </a:solidFill>
+                    <a:latin typeface="Corbel"/>
+                  </a:rPr>
+                  <a:t>instanceOf</a:t>
+                </a:r>
+                <a:endParaRPr lang="en-US" sz="1400" kern="0" dirty="0">
+                  <a:solidFill>
+                    <a:srgbClr val="30ACEC">
+                      <a:lumMod val="75000"/>
+                    </a:srgbClr>
+                  </a:solidFill>
+                  <a:latin typeface="Corbel"/>
+                </a:endParaRPr>
+              </a:p>
+            </p:txBody>
+          </p:sp>
+          <p:sp>
+            <p:nvSpPr>
+              <p:cNvPr id="26" name="TextBox 25">
+                <a:extLst>
+                  <a:ext uri="{FF2B5EF4-FFF2-40B4-BE49-F238E27FC236}">
+                    <a16:creationId xmlns:a16="http://schemas.microsoft.com/office/drawing/2014/main" id="{FB02C52E-FED1-4D44-B50E-1D61CBCF9695}"/>
+                  </a:ext>
+                </a:extLst>
+              </p:cNvPr>
+              <p:cNvSpPr txBox="1"/>
+              <p:nvPr/>
+            </p:nvSpPr>
+            <p:spPr>
+              <a:xfrm>
+                <a:off x="6008508" y="3986161"/>
+                <a:ext cx="995785" cy="307777"/>
+              </a:xfrm>
+              <a:prstGeom prst="rect">
+                <a:avLst/>
+              </a:prstGeom>
+              <a:noFill/>
+              <a:ln>
+                <a:noFill/>
+              </a:ln>
+            </p:spPr>
+            <p:txBody>
+              <a:bodyPr wrap="none" rtlCol="0">
+                <a:spAutoFit/>
+              </a:bodyPr>
+              <a:lstStyle/>
+              <a:p>
+                <a:pPr lvl="0">
+                  <a:defRPr/>
+                </a:pPr>
+                <a:r>
+                  <a:rPr lang="en-US" sz="1400" kern="0" dirty="0" err="1">
+                    <a:solidFill>
+                      <a:srgbClr val="30ACEC">
+                        <a:lumMod val="75000"/>
+                      </a:srgbClr>
+                    </a:solidFill>
+                    <a:latin typeface="Corbel"/>
+                  </a:rPr>
+                  <a:t>instanceOf</a:t>
+                </a:r>
+                <a:endParaRPr lang="en-US" sz="1400" kern="0" dirty="0">
+                  <a:solidFill>
+                    <a:srgbClr val="30ACEC">
+                      <a:lumMod val="75000"/>
+                    </a:srgbClr>
+                  </a:solidFill>
+                  <a:latin typeface="Corbel"/>
+                </a:endParaRPr>
+              </a:p>
+            </p:txBody>
+          </p:sp>
+        </p:grpSp>
+        <p:grpSp>
+          <p:nvGrpSpPr>
+            <p:cNvPr id="39" name="Group 38">
+              <a:extLst>
+                <a:ext uri="{FF2B5EF4-FFF2-40B4-BE49-F238E27FC236}">
+                  <a16:creationId xmlns:a16="http://schemas.microsoft.com/office/drawing/2014/main" id="{55A88EF8-3C31-AE4A-9CF3-A6E41F99D05D}"/>
+                </a:ext>
+              </a:extLst>
+            </p:cNvPr>
+            <p:cNvGrpSpPr/>
+            <p:nvPr/>
+          </p:nvGrpSpPr>
+          <p:grpSpPr>
+            <a:xfrm>
+              <a:off x="1420690" y="1718987"/>
+              <a:ext cx="6347460" cy="843949"/>
+              <a:chOff x="1471490" y="1748852"/>
+              <a:chExt cx="6347460" cy="843949"/>
+            </a:xfrm>
+          </p:grpSpPr>
+          <p:sp>
+            <p:nvSpPr>
+              <p:cNvPr id="40" name="Rectangle 39">
+                <a:extLst>
+                  <a:ext uri="{FF2B5EF4-FFF2-40B4-BE49-F238E27FC236}">
+                    <a16:creationId xmlns:a16="http://schemas.microsoft.com/office/drawing/2014/main" id="{0E7D155B-7734-CF4C-B4D6-5547A7F83D26}"/>
+                  </a:ext>
+                </a:extLst>
+              </p:cNvPr>
+              <p:cNvSpPr/>
+              <p:nvPr/>
+            </p:nvSpPr>
+            <p:spPr>
+              <a:xfrm>
+                <a:off x="1471490" y="2186401"/>
+                <a:ext cx="1737360" cy="406400"/>
+              </a:xfrm>
+              <a:prstGeom prst="rect">
+                <a:avLst/>
+              </a:prstGeom>
+              <a:solidFill>
+                <a:srgbClr val="30ACEC">
+                  <a:lumMod val="40000"/>
+                  <a:lumOff val="60000"/>
+                </a:srgbClr>
+              </a:solidFill>
+              <a:ln w="15875" cap="rnd" cmpd="sng" algn="ctr">
+                <a:solidFill>
+                  <a:srgbClr val="30ACEC">
+                    <a:shade val="50000"/>
+                  </a:srgbClr>
+                </a:solidFill>
+                <a:prstDash val="solid"/>
+              </a:ln>
+              <a:effectLst/>
+            </p:spPr>
+            <p:txBody>
+              <a:bodyPr rtlCol="0" anchor="ctr"/>
+              <a:lstStyle/>
+              <a:p>
+                <a:pPr marL="0" marR="0" lvl="0" indent="0" algn="ctr" defTabSz="914400" eaLnBrk="1" fontAlgn="auto" latinLnBrk="0" hangingPunct="1">
+                  <a:lnSpc>
+                    <a:spcPct val="100000"/>
+                  </a:lnSpc>
+                  <a:spcBef>
+                    <a:spcPts val="0"/>
+                  </a:spcBef>
+                  <a:spcAft>
+                    <a:spcPts val="0"/>
+                  </a:spcAft>
+                  <a:buClrTx/>
+                  <a:buSzTx/>
+                  <a:buFontTx/>
+                  <a:buNone/>
+                  <a:tabLst/>
+                  <a:defRPr/>
+                </a:pPr>
+                <a:r>
+                  <a:rPr kumimoji="0" lang="en-US" sz="1800" b="1" i="0" u="none" strike="noStrike" kern="0" cap="none" spc="0" normalizeH="0" baseline="0" noProof="0" dirty="0" err="1">
+                    <a:ln>
+                      <a:noFill/>
+                    </a:ln>
+                    <a:solidFill>
+                      <a:prstClr val="black"/>
+                    </a:solidFill>
+                    <a:effectLst/>
+                    <a:uLnTx/>
+                    <a:uFillTx/>
+                    <a:latin typeface="Corbel"/>
+                    <a:ea typeface="+mn-ea"/>
+                    <a:cs typeface="+mn-cs"/>
+                  </a:rPr>
+                  <a:t>SubComponent</a:t>
+                </a:r>
+                <a:endParaRPr kumimoji="0" lang="en-US" sz="1800" b="0" i="0" u="none" strike="noStrike" kern="0" cap="none" spc="0" normalizeH="0" baseline="0" noProof="0" dirty="0">
+                  <a:ln>
+                    <a:noFill/>
+                  </a:ln>
+                  <a:solidFill>
+                    <a:prstClr val="black"/>
+                  </a:solidFill>
+                  <a:effectLst/>
+                  <a:uLnTx/>
+                  <a:uFillTx/>
+                  <a:latin typeface="Corbel"/>
+                  <a:ea typeface="+mn-ea"/>
+                  <a:cs typeface="+mn-cs"/>
+                </a:endParaRPr>
+              </a:p>
+            </p:txBody>
+          </p:sp>
+          <p:sp>
+            <p:nvSpPr>
+              <p:cNvPr id="41" name="Rectangle 40">
+                <a:extLst>
+                  <a:ext uri="{FF2B5EF4-FFF2-40B4-BE49-F238E27FC236}">
+                    <a16:creationId xmlns:a16="http://schemas.microsoft.com/office/drawing/2014/main" id="{921B43F5-2C94-1940-9138-9C95DDF325D2}"/>
+                  </a:ext>
+                </a:extLst>
+              </p:cNvPr>
+              <p:cNvSpPr/>
+              <p:nvPr/>
+            </p:nvSpPr>
+            <p:spPr>
+              <a:xfrm>
+                <a:off x="6081590" y="2186401"/>
+                <a:ext cx="1737360" cy="406400"/>
+              </a:xfrm>
+              <a:prstGeom prst="rect">
+                <a:avLst/>
+              </a:prstGeom>
+              <a:solidFill>
+                <a:srgbClr val="30ACEC">
+                  <a:lumMod val="40000"/>
+                  <a:lumOff val="60000"/>
+                </a:srgbClr>
+              </a:solidFill>
+              <a:ln w="15875" cap="rnd" cmpd="sng" algn="ctr">
+                <a:solidFill>
+                  <a:srgbClr val="30ACEC">
+                    <a:shade val="50000"/>
+                  </a:srgbClr>
+                </a:solidFill>
+                <a:prstDash val="solid"/>
+              </a:ln>
+              <a:effectLst/>
+            </p:spPr>
+            <p:txBody>
+              <a:bodyPr rtlCol="0" anchor="ctr"/>
+              <a:lstStyle/>
+              <a:p>
+                <a:pPr marL="0" marR="0" lvl="0" indent="0" algn="ctr" defTabSz="914400" eaLnBrk="1" fontAlgn="auto" latinLnBrk="0" hangingPunct="1">
+                  <a:lnSpc>
+                    <a:spcPct val="100000"/>
+                  </a:lnSpc>
+                  <a:spcBef>
+                    <a:spcPts val="0"/>
+                  </a:spcBef>
+                  <a:spcAft>
+                    <a:spcPts val="0"/>
+                  </a:spcAft>
+                  <a:buClrTx/>
+                  <a:buSzTx/>
+                  <a:buFontTx/>
+                  <a:buNone/>
+                  <a:tabLst/>
+                  <a:defRPr/>
+                </a:pPr>
+                <a:r>
+                  <a:rPr kumimoji="0" lang="en-US" sz="1800" b="1" i="0" u="none" strike="noStrike" kern="0" cap="none" spc="0" normalizeH="0" baseline="0" noProof="0" dirty="0" err="1">
+                    <a:ln>
+                      <a:noFill/>
+                    </a:ln>
+                    <a:solidFill>
+                      <a:prstClr val="black"/>
+                    </a:solidFill>
+                    <a:effectLst/>
+                    <a:uLnTx/>
+                    <a:uFillTx/>
+                    <a:latin typeface="Corbel"/>
+                    <a:ea typeface="+mn-ea"/>
+                    <a:cs typeface="+mn-cs"/>
+                  </a:rPr>
+                  <a:t>SubComponent</a:t>
+                </a:r>
+                <a:endParaRPr kumimoji="0" lang="en-US" sz="1800" b="0" i="0" u="none" strike="noStrike" kern="0" cap="none" spc="0" normalizeH="0" baseline="0" noProof="0" dirty="0">
+                  <a:ln>
+                    <a:noFill/>
+                  </a:ln>
+                  <a:solidFill>
+                    <a:prstClr val="black"/>
+                  </a:solidFill>
+                  <a:effectLst/>
+                  <a:uLnTx/>
+                  <a:uFillTx/>
+                  <a:latin typeface="Corbel"/>
+                  <a:ea typeface="+mn-ea"/>
+                  <a:cs typeface="+mn-cs"/>
+                </a:endParaRPr>
+              </a:p>
+            </p:txBody>
+          </p:sp>
+          <p:sp>
+            <p:nvSpPr>
+              <p:cNvPr id="42" name="Rectangle 41">
+                <a:extLst>
+                  <a:ext uri="{FF2B5EF4-FFF2-40B4-BE49-F238E27FC236}">
+                    <a16:creationId xmlns:a16="http://schemas.microsoft.com/office/drawing/2014/main" id="{F6A90DA3-8B07-6C4D-912A-163E41143AC8}"/>
+                  </a:ext>
+                </a:extLst>
+              </p:cNvPr>
+              <p:cNvSpPr/>
+              <p:nvPr/>
+            </p:nvSpPr>
+            <p:spPr>
+              <a:xfrm>
+                <a:off x="3751140" y="2186401"/>
+                <a:ext cx="1737360" cy="406400"/>
+              </a:xfrm>
+              <a:prstGeom prst="rect">
+                <a:avLst/>
+              </a:prstGeom>
+              <a:solidFill>
+                <a:srgbClr val="30ACEC">
+                  <a:lumMod val="40000"/>
+                  <a:lumOff val="60000"/>
+                </a:srgbClr>
+              </a:solidFill>
+              <a:ln w="15875" cap="rnd" cmpd="sng" algn="ctr">
+                <a:solidFill>
+                  <a:srgbClr val="30ACEC">
+                    <a:shade val="50000"/>
+                  </a:srgbClr>
+                </a:solidFill>
+                <a:prstDash val="solid"/>
+              </a:ln>
+              <a:effectLst/>
+            </p:spPr>
+            <p:txBody>
+              <a:bodyPr rtlCol="0" anchor="ctr"/>
+              <a:lstStyle/>
+              <a:p>
+                <a:pPr marL="0" marR="0" lvl="0" indent="0" algn="ctr" defTabSz="914400" eaLnBrk="1" fontAlgn="auto" latinLnBrk="0" hangingPunct="1">
+                  <a:lnSpc>
+                    <a:spcPct val="100000"/>
+                  </a:lnSpc>
+                  <a:spcBef>
+                    <a:spcPts val="0"/>
+                  </a:spcBef>
+                  <a:spcAft>
+                    <a:spcPts val="0"/>
+                  </a:spcAft>
+                  <a:buClrTx/>
+                  <a:buSzTx/>
+                  <a:buFontTx/>
+                  <a:buNone/>
+                  <a:tabLst/>
+                  <a:defRPr/>
+                </a:pPr>
+                <a:r>
+                  <a:rPr kumimoji="0" lang="en-US" sz="1800" b="1" i="0" u="none" strike="noStrike" kern="0" cap="none" spc="0" normalizeH="0" baseline="0" noProof="0" dirty="0" err="1">
+                    <a:ln>
+                      <a:noFill/>
+                    </a:ln>
+                    <a:solidFill>
+                      <a:prstClr val="black"/>
+                    </a:solidFill>
+                    <a:effectLst/>
+                    <a:uLnTx/>
+                    <a:uFillTx/>
+                    <a:latin typeface="Corbel"/>
+                    <a:ea typeface="+mn-ea"/>
+                    <a:cs typeface="+mn-cs"/>
+                  </a:rPr>
+                  <a:t>SubComponent</a:t>
+                </a:r>
+                <a:endParaRPr kumimoji="0" lang="en-US" sz="1800" b="0" i="0" u="none" strike="noStrike" kern="0" cap="none" spc="0" normalizeH="0" baseline="0" noProof="0" dirty="0">
+                  <a:ln>
+                    <a:noFill/>
+                  </a:ln>
+                  <a:solidFill>
+                    <a:prstClr val="black"/>
+                  </a:solidFill>
+                  <a:effectLst/>
+                  <a:uLnTx/>
+                  <a:uFillTx/>
+                  <a:latin typeface="Corbel"/>
+                  <a:ea typeface="+mn-ea"/>
+                  <a:cs typeface="+mn-cs"/>
+                </a:endParaRPr>
+              </a:p>
+            </p:txBody>
+          </p:sp>
+          <p:cxnSp>
+            <p:nvCxnSpPr>
+              <p:cNvPr id="43" name="Straight Arrow Connector 54">
+                <a:extLst>
+                  <a:ext uri="{FF2B5EF4-FFF2-40B4-BE49-F238E27FC236}">
+                    <a16:creationId xmlns:a16="http://schemas.microsoft.com/office/drawing/2014/main" id="{D2964942-11E1-AC41-AFC6-BDAC2A5EA3C9}"/>
+                  </a:ext>
+                </a:extLst>
+              </p:cNvPr>
+              <p:cNvCxnSpPr>
+                <a:stCxn id="11" idx="2"/>
+                <a:endCxn id="40" idx="0"/>
+              </p:cNvCxnSpPr>
+              <p:nvPr/>
+            </p:nvCxnSpPr>
+            <p:spPr>
+              <a:xfrm rot="5400000">
+                <a:off x="3297711" y="861312"/>
+                <a:ext cx="367548" cy="2282630"/>
+              </a:xfrm>
+              <a:prstGeom prst="bentConnector3">
+                <a:avLst>
+                  <a:gd name="adj1" fmla="val 50000"/>
+                </a:avLst>
+              </a:prstGeom>
+              <a:noFill/>
+              <a:ln w="38100" cap="rnd" cmpd="sng" algn="ctr">
+                <a:solidFill>
+                  <a:srgbClr val="30ACEC">
+                    <a:lumMod val="75000"/>
+                  </a:srgbClr>
+                </a:solidFill>
+                <a:prstDash val="solid"/>
+                <a:tailEnd type="triangle"/>
+              </a:ln>
+              <a:effectLst/>
+            </p:spPr>
+          </p:cxnSp>
+          <p:cxnSp>
+            <p:nvCxnSpPr>
+              <p:cNvPr id="44" name="Straight Arrow Connector 54">
+                <a:extLst>
+                  <a:ext uri="{FF2B5EF4-FFF2-40B4-BE49-F238E27FC236}">
+                    <a16:creationId xmlns:a16="http://schemas.microsoft.com/office/drawing/2014/main" id="{AA9388E9-78DE-0641-8B39-8967916B7A52}"/>
+                  </a:ext>
+                </a:extLst>
+              </p:cNvPr>
+              <p:cNvCxnSpPr>
+                <a:stCxn id="11" idx="2"/>
+                <a:endCxn id="42" idx="0"/>
+              </p:cNvCxnSpPr>
+              <p:nvPr/>
+            </p:nvCxnSpPr>
+            <p:spPr>
+              <a:xfrm rot="5400000">
+                <a:off x="4437536" y="2001137"/>
+                <a:ext cx="367548" cy="2980"/>
+              </a:xfrm>
+              <a:prstGeom prst="bentConnector3">
+                <a:avLst>
+                  <a:gd name="adj1" fmla="val 50000"/>
+                </a:avLst>
+              </a:prstGeom>
+              <a:noFill/>
+              <a:ln w="38100" cap="rnd" cmpd="sng" algn="ctr">
+                <a:solidFill>
+                  <a:srgbClr val="30ACEC">
+                    <a:lumMod val="75000"/>
+                  </a:srgbClr>
+                </a:solidFill>
+                <a:prstDash val="solid"/>
+                <a:tailEnd type="triangle"/>
+              </a:ln>
+              <a:effectLst/>
+            </p:spPr>
+          </p:cxnSp>
+          <p:cxnSp>
+            <p:nvCxnSpPr>
+              <p:cNvPr id="45" name="Straight Arrow Connector 54">
+                <a:extLst>
+                  <a:ext uri="{FF2B5EF4-FFF2-40B4-BE49-F238E27FC236}">
+                    <a16:creationId xmlns:a16="http://schemas.microsoft.com/office/drawing/2014/main" id="{43C96226-7B41-184A-8F50-A484F134E415}"/>
+                  </a:ext>
+                </a:extLst>
+              </p:cNvPr>
+              <p:cNvCxnSpPr>
+                <a:stCxn id="11" idx="2"/>
+                <a:endCxn id="41" idx="0"/>
+              </p:cNvCxnSpPr>
+              <p:nvPr/>
+            </p:nvCxnSpPr>
+            <p:spPr>
+              <a:xfrm rot="16200000" flipH="1">
+                <a:off x="5602761" y="838892"/>
+                <a:ext cx="367548" cy="2327470"/>
+              </a:xfrm>
+              <a:prstGeom prst="bentConnector3">
+                <a:avLst>
+                  <a:gd name="adj1" fmla="val 50000"/>
+                </a:avLst>
+              </a:prstGeom>
+              <a:noFill/>
+              <a:ln w="38100" cap="rnd" cmpd="sng" algn="ctr">
+                <a:solidFill>
+                  <a:srgbClr val="30ACEC">
+                    <a:lumMod val="75000"/>
+                  </a:srgbClr>
+                </a:solidFill>
+                <a:prstDash val="solid"/>
+                <a:tailEnd type="triangle"/>
+              </a:ln>
+              <a:effectLst/>
+            </p:spPr>
+          </p:cxnSp>
+          <p:sp>
+            <p:nvSpPr>
+              <p:cNvPr id="46" name="TextBox 45">
+                <a:extLst>
+                  <a:ext uri="{FF2B5EF4-FFF2-40B4-BE49-F238E27FC236}">
+                    <a16:creationId xmlns:a16="http://schemas.microsoft.com/office/drawing/2014/main" id="{46AE5252-77CA-9F44-A353-B2059B24AD34}"/>
+                  </a:ext>
+                </a:extLst>
+              </p:cNvPr>
+              <p:cNvSpPr txBox="1"/>
+              <p:nvPr/>
+            </p:nvSpPr>
+            <p:spPr>
+              <a:xfrm>
+                <a:off x="4607290" y="1748852"/>
+                <a:ext cx="1015021" cy="307777"/>
+              </a:xfrm>
+              <a:prstGeom prst="rect">
+                <a:avLst/>
+              </a:prstGeom>
+              <a:noFill/>
+            </p:spPr>
+            <p:txBody>
+              <a:bodyPr wrap="none" rtlCol="0">
+                <a:spAutoFit/>
+              </a:bodyPr>
+              <a:lstStyle/>
+              <a:p>
+                <a:pPr marL="0" marR="0" lvl="0" indent="0" defTabSz="914400" eaLnBrk="1" fontAlgn="auto" latinLnBrk="0" hangingPunct="1">
+                  <a:lnSpc>
+                    <a:spcPct val="100000"/>
+                  </a:lnSpc>
+                  <a:spcBef>
+                    <a:spcPts val="0"/>
+                  </a:spcBef>
+                  <a:spcAft>
+                    <a:spcPts val="0"/>
+                  </a:spcAft>
+                  <a:buClrTx/>
+                  <a:buSzTx/>
+                  <a:buFontTx/>
+                  <a:buNone/>
+                  <a:tabLst/>
+                  <a:defRPr/>
+                </a:pPr>
+                <a:r>
+                  <a:rPr kumimoji="0" lang="en-US" sz="1400" b="0" i="0" u="none" strike="noStrike" kern="0" cap="none" spc="0" normalizeH="0" baseline="0" noProof="0" dirty="0" err="1">
+                    <a:ln>
+                      <a:noFill/>
+                    </a:ln>
+                    <a:solidFill>
+                      <a:srgbClr val="30ACEC">
+                        <a:lumMod val="75000"/>
+                      </a:srgbClr>
+                    </a:solidFill>
+                    <a:effectLst/>
+                    <a:uLnTx/>
+                    <a:uFillTx/>
+                    <a:latin typeface="Corbel"/>
+                  </a:rPr>
+                  <a:t>hasFeature</a:t>
+                </a:r>
+                <a:endParaRPr kumimoji="0" lang="en-US" sz="1400" b="0" i="0" u="none" strike="noStrike" kern="0" cap="none" spc="0" normalizeH="0" baseline="0" noProof="0" dirty="0">
+                  <a:ln>
+                    <a:noFill/>
+                  </a:ln>
+                  <a:solidFill>
+                    <a:srgbClr val="30ACEC">
+                      <a:lumMod val="75000"/>
+                    </a:srgbClr>
+                  </a:solidFill>
+                  <a:effectLst/>
+                  <a:uLnTx/>
+                  <a:uFillTx/>
+                  <a:latin typeface="Corbel"/>
+                </a:endParaRPr>
+              </a:p>
+            </p:txBody>
+          </p:sp>
+        </p:grpSp>
+      </p:grpSp>
       <p:sp>
         <p:nvSpPr>
           <p:cNvPr id="2" name="Slide Number Placeholder 1">
@@ -17007,50 +19540,6 @@
           </a:p>
         </p:txBody>
       </p:sp>
-      <p:pic>
-        <p:nvPicPr>
-          <p:cNvPr id="6" name="Picture 5">
-            <a:extLst>
-              <a:ext uri="{FF2B5EF4-FFF2-40B4-BE49-F238E27FC236}">
-                <a16:creationId xmlns:a16="http://schemas.microsoft.com/office/drawing/2014/main" id="{85FD75C6-B7C4-2445-8980-5F517694B3AB}"/>
-              </a:ext>
-            </a:extLst>
-          </p:cNvPr>
-          <p:cNvPicPr>
-            <a:picLocks noChangeAspect="1"/>
-          </p:cNvPicPr>
-          <p:nvPr/>
-        </p:nvPicPr>
-        <p:blipFill>
-          <a:blip r:embed="rId2"/>
-          <a:stretch>
-            <a:fillRect/>
-          </a:stretch>
-        </p:blipFill>
-        <p:spPr>
-          <a:xfrm>
-            <a:off x="2301358" y="1094149"/>
-            <a:ext cx="7589283" cy="4280604"/>
-          </a:xfrm>
-          <a:prstGeom prst="rect">
-            <a:avLst/>
-          </a:prstGeom>
-          <a:ln w="38100" cap="sq">
-            <a:solidFill>
-              <a:srgbClr val="000000"/>
-            </a:solidFill>
-            <a:prstDash val="solid"/>
-            <a:miter lim="800000"/>
-          </a:ln>
-          <a:effectLst>
-            <a:outerShdw blurRad="50800" dist="38100" dir="2700000" algn="tl" rotWithShape="0">
-              <a:srgbClr val="000000">
-                <a:alpha val="43000"/>
-              </a:srgbClr>
-            </a:outerShdw>
-          </a:effectLst>
-        </p:spPr>
-      </p:pic>
       <p:sp>
         <p:nvSpPr>
           <p:cNvPr id="7" name="TextBox 6">
@@ -17115,7 +19604,7 @@
         </p:nvSpPr>
         <p:spPr>
           <a:xfrm>
-            <a:off x="4202892" y="3562825"/>
+            <a:off x="4040332" y="3562825"/>
             <a:ext cx="659155" cy="369332"/>
           </a:xfrm>
           <a:prstGeom prst="rect">
@@ -17165,7 +19654,7 @@
         </p:nvSpPr>
         <p:spPr>
           <a:xfrm>
-            <a:off x="6763580" y="3562825"/>
+            <a:off x="7048060" y="3562825"/>
             <a:ext cx="671979" cy="369332"/>
           </a:xfrm>
           <a:prstGeom prst="rect">
@@ -18821,19 +21310,19 @@
 </file>
 
 <file path=customXml/itemProps1.xml><?xml version="1.0" encoding="utf-8"?>
+<ds:datastoreItem xmlns:ds="http://schemas.openxmlformats.org/officeDocument/2006/customXml" ds:itemID="{D88A9972-54D5-4A46-9260-9FE1CB78EDF2}">
+  <ds:schemaRefs>
+    <ds:schemaRef ds:uri="http://www.w3.org/2001/XMLSchema"/>
+    <ds:schemaRef ds:uri="http://www.boldonjames.com/2008/01/sie/internal/label"/>
+  </ds:schemaRefs>
+</ds:datastoreItem>
+</file>
+
+<file path=customXml/itemProps2.xml><?xml version="1.0" encoding="utf-8"?>
 <ds:datastoreItem xmlns:ds="http://schemas.openxmlformats.org/officeDocument/2006/customXml" ds:itemID="{26C53044-EDCC-4767-9B64-ABCDF4BF539A}">
   <ds:schemaRefs>
     <ds:schemaRef ds:uri="http://www.w3.org/2001/XMLSchema"/>
     <ds:schemaRef ds:uri="http://www.boldonjames.com/2016/02/Classifier/internal/wrappedLabelHistory"/>
   </ds:schemaRefs>
 </ds:datastoreItem>
-</file>
-
-<file path=customXml/itemProps2.xml><?xml version="1.0" encoding="utf-8"?>
-<ds:datastoreItem xmlns:ds="http://schemas.openxmlformats.org/officeDocument/2006/customXml" ds:itemID="{D88A9972-54D5-4A46-9260-9FE1CB78EDF2}">
-  <ds:schemaRefs>
-    <ds:schemaRef ds:uri="http://www.w3.org/2001/XMLSchema"/>
-    <ds:schemaRef ds:uri="http://www.boldonjames.com/2008/01/sie/internal/label"/>
-  </ds:schemaRefs>
-</ds:datastoreItem>
 </file>
</xml_diff>

<commit_message>
Add slide for tutorial set-up
</commit_message>
<xml_diff>
--- a/2021/IWBDA21/pySBOL3-IWBDA-2021.pptx
+++ b/2021/IWBDA21/pySBOL3-IWBDA-2021.pptx
@@ -8,10 +8,10 @@
     <p:sldMasterId id="2147483672" r:id="rId6"/>
   </p:sldMasterIdLst>
   <p:notesMasterIdLst>
-    <p:notesMasterId r:id="rId20"/>
+    <p:notesMasterId r:id="rId21"/>
   </p:notesMasterIdLst>
   <p:handoutMasterIdLst>
-    <p:handoutMasterId r:id="rId21"/>
+    <p:handoutMasterId r:id="rId22"/>
   </p:handoutMasterIdLst>
   <p:sldIdLst>
     <p:sldId id="325" r:id="rId7"/>
@@ -27,6 +27,7 @@
     <p:sldId id="338" r:id="rId17"/>
     <p:sldId id="339" r:id="rId18"/>
     <p:sldId id="285" r:id="rId19"/>
+    <p:sldId id="342" r:id="rId20"/>
   </p:sldIdLst>
   <p:sldSz cx="12192000" cy="6858000"/>
   <p:notesSz cx="6858000" cy="9144000"/>
@@ -9305,14 +9306,14 @@
           </a:ln>
           <a:extLst>
             <a:ext uri="{909E8E84-426E-40dd-AFC4-6F175D3DCCD1}">
-              <a14:hiddenFill xmlns="" xmlns:a14="http://schemas.microsoft.com/office/drawing/2010/main">
+              <a14:hiddenFill xmlns:a14="http://schemas.microsoft.com/office/drawing/2010/main" xmlns="">
                 <a:solidFill>
                   <a:srgbClr val="FFFFFF"/>
                 </a:solidFill>
               </a14:hiddenFill>
             </a:ext>
             <a:ext uri="{91240B29-F687-4f45-9708-019B960494DF}">
-              <a14:hiddenLine xmlns="" xmlns:a14="http://schemas.microsoft.com/office/drawing/2010/main" w="9525">
+              <a14:hiddenLine xmlns:a14="http://schemas.microsoft.com/office/drawing/2010/main" xmlns="" w="9525">
                 <a:solidFill>
                   <a:srgbClr val="000000"/>
                 </a:solidFill>
@@ -9570,14 +9571,14 @@
           </a:ln>
           <a:extLst>
             <a:ext uri="{909E8E84-426E-40dd-AFC4-6F175D3DCCD1}">
-              <a14:hiddenFill xmlns="" xmlns:a14="http://schemas.microsoft.com/office/drawing/2010/main">
+              <a14:hiddenFill xmlns:a14="http://schemas.microsoft.com/office/drawing/2010/main" xmlns="">
                 <a:solidFill>
                   <a:srgbClr val="FFFFFF"/>
                 </a:solidFill>
               </a14:hiddenFill>
             </a:ext>
             <a:ext uri="{91240B29-F687-4f45-9708-019B960494DF}">
-              <a14:hiddenLine xmlns="" xmlns:a14="http://schemas.microsoft.com/office/drawing/2010/main" w="9525">
+              <a14:hiddenLine xmlns:a14="http://schemas.microsoft.com/office/drawing/2010/main" xmlns="" w="9525">
                 <a:solidFill>
                   <a:srgbClr val="000000"/>
                 </a:solidFill>
@@ -15896,6 +15897,703 @@
 </p:sld>
 </file>
 
+<file path=ppt/slides/slide14.xml><?xml version="1.0" encoding="utf-8"?>
+<p:sld xmlns:a="http://schemas.openxmlformats.org/drawingml/2006/main" xmlns:r="http://schemas.openxmlformats.org/officeDocument/2006/relationships" xmlns:p="http://schemas.openxmlformats.org/presentationml/2006/main">
+  <p:cSld>
+    <p:spTree>
+      <p:nvGrpSpPr>
+        <p:cNvPr id="1" name=""/>
+        <p:cNvGrpSpPr/>
+        <p:nvPr/>
+      </p:nvGrpSpPr>
+      <p:grpSpPr>
+        <a:xfrm>
+          <a:off x="0" y="0"/>
+          <a:ext cx="0" cy="0"/>
+          <a:chOff x="0" y="0"/>
+          <a:chExt cx="0" cy="0"/>
+        </a:xfrm>
+      </p:grpSpPr>
+      <p:sp>
+        <p:nvSpPr>
+          <p:cNvPr id="2" name="Slide Number Placeholder 1">
+            <a:extLst>
+              <a:ext uri="{FF2B5EF4-FFF2-40B4-BE49-F238E27FC236}">
+                <a16:creationId xmlns:a16="http://schemas.microsoft.com/office/drawing/2014/main" id="{C26B5C20-31A4-124D-94AD-FE057267EA5F}"/>
+              </a:ext>
+            </a:extLst>
+          </p:cNvPr>
+          <p:cNvSpPr>
+            <a:spLocks noGrp="1"/>
+          </p:cNvSpPr>
+          <p:nvPr>
+            <p:ph type="sldNum" sz="quarter" idx="4"/>
+          </p:nvPr>
+        </p:nvSpPr>
+        <p:spPr>
+          <a:xfrm>
+            <a:off x="10983397" y="5811454"/>
+            <a:ext cx="531946" cy="365125"/>
+          </a:xfrm>
+        </p:spPr>
+        <p:txBody>
+          <a:bodyPr/>
+          <a:lstStyle/>
+          <a:p>
+            <a:fld id="{07165E6F-54ED-4977-A15E-D44BE7238A65}" type="slidenum">
+              <a:rPr lang="en-US" smtClean="0"/>
+              <a:pPr/>
+              <a:t>14</a:t>
+            </a:fld>
+            <a:endParaRPr lang="en-US" dirty="0"/>
+          </a:p>
+        </p:txBody>
+      </p:sp>
+      <p:sp>
+        <p:nvSpPr>
+          <p:cNvPr id="3" name="Title 2">
+            <a:extLst>
+              <a:ext uri="{FF2B5EF4-FFF2-40B4-BE49-F238E27FC236}">
+                <a16:creationId xmlns:a16="http://schemas.microsoft.com/office/drawing/2014/main" id="{95B22AA0-18B9-EC4D-BB7F-C779D5A01F20}"/>
+              </a:ext>
+            </a:extLst>
+          </p:cNvPr>
+          <p:cNvSpPr>
+            <a:spLocks noGrp="1"/>
+          </p:cNvSpPr>
+          <p:nvPr>
+            <p:ph type="title"/>
+          </p:nvPr>
+        </p:nvSpPr>
+        <p:spPr/>
+        <p:txBody>
+          <a:bodyPr/>
+          <a:lstStyle/>
+          <a:p>
+            <a:r>
+              <a:rPr lang="en-US" dirty="0"/>
+              <a:t>Tutorial Set-up</a:t>
+            </a:r>
+          </a:p>
+        </p:txBody>
+      </p:sp>
+      <p:sp>
+        <p:nvSpPr>
+          <p:cNvPr id="5" name="Text Placeholder 1">
+            <a:extLst>
+              <a:ext uri="{FF2B5EF4-FFF2-40B4-BE49-F238E27FC236}">
+                <a16:creationId xmlns:a16="http://schemas.microsoft.com/office/drawing/2014/main" id="{5DC6D4B2-B954-C148-9D63-BB595BDA7D19}"/>
+              </a:ext>
+            </a:extLst>
+          </p:cNvPr>
+          <p:cNvSpPr txBox="1">
+            <a:spLocks/>
+          </p:cNvSpPr>
+          <p:nvPr/>
+        </p:nvSpPr>
+        <p:spPr>
+          <a:xfrm>
+            <a:off x="685799" y="1003773"/>
+            <a:ext cx="10829543" cy="4218467"/>
+          </a:xfrm>
+          <a:prstGeom prst="rect">
+            <a:avLst/>
+          </a:prstGeom>
+        </p:spPr>
+        <p:txBody>
+          <a:bodyPr/>
+          <a:lstStyle>
+            <a:lvl1pPr marL="219456" indent="-219456" algn="l" defTabSz="914400" rtl="0" eaLnBrk="1" latinLnBrk="0" hangingPunct="1">
+              <a:lnSpc>
+                <a:spcPct val="100000"/>
+              </a:lnSpc>
+              <a:spcBef>
+                <a:spcPts val="0"/>
+              </a:spcBef>
+              <a:spcAft>
+                <a:spcPts val="600"/>
+              </a:spcAft>
+              <a:buClr>
+                <a:schemeClr val="tx2"/>
+              </a:buClr>
+              <a:buSzPct val="75000"/>
+              <a:buFont typeface="Arial" panose="020B0604020202020204" pitchFamily="34" charset="0"/>
+              <a:buChar char="•"/>
+              <a:defRPr sz="1600" kern="1200">
+                <a:solidFill>
+                  <a:schemeClr val="tx1"/>
+                </a:solidFill>
+                <a:latin typeface="+mn-lt"/>
+                <a:ea typeface="+mn-ea"/>
+                <a:cs typeface="+mn-cs"/>
+              </a:defRPr>
+            </a:lvl1pPr>
+            <a:lvl2pPr marL="438912" indent="-219456" algn="l" defTabSz="914400" rtl="0" eaLnBrk="1" latinLnBrk="0" hangingPunct="1">
+              <a:lnSpc>
+                <a:spcPct val="100000"/>
+              </a:lnSpc>
+              <a:spcBef>
+                <a:spcPts val="0"/>
+              </a:spcBef>
+              <a:spcAft>
+                <a:spcPts val="600"/>
+              </a:spcAft>
+              <a:buSzPct val="100000"/>
+              <a:buFont typeface="Arial" panose="020B0604020202020204" pitchFamily="34" charset="0"/>
+              <a:buChar char="–"/>
+              <a:defRPr sz="1600" kern="1200">
+                <a:solidFill>
+                  <a:schemeClr val="tx1"/>
+                </a:solidFill>
+                <a:latin typeface="+mn-lt"/>
+                <a:ea typeface="+mn-ea"/>
+                <a:cs typeface="+mn-cs"/>
+              </a:defRPr>
+            </a:lvl2pPr>
+            <a:lvl3pPr marL="621792" indent="-219456" algn="l" defTabSz="914400" rtl="0" eaLnBrk="1" latinLnBrk="0" hangingPunct="1">
+              <a:lnSpc>
+                <a:spcPct val="100000"/>
+              </a:lnSpc>
+              <a:spcBef>
+                <a:spcPts val="0"/>
+              </a:spcBef>
+              <a:spcAft>
+                <a:spcPts val="600"/>
+              </a:spcAft>
+              <a:buClr>
+                <a:schemeClr val="tx2"/>
+              </a:buClr>
+              <a:buSzPct val="75000"/>
+              <a:buFont typeface="Arial" panose="020B0604020202020204" pitchFamily="34" charset="0"/>
+              <a:buChar char="•"/>
+              <a:defRPr sz="1600" kern="1200">
+                <a:solidFill>
+                  <a:schemeClr val="tx1"/>
+                </a:solidFill>
+                <a:latin typeface="+mn-lt"/>
+                <a:ea typeface="+mn-ea"/>
+                <a:cs typeface="+mn-cs"/>
+              </a:defRPr>
+            </a:lvl3pPr>
+            <a:lvl4pPr marL="841248" indent="-219456" algn="l" defTabSz="914400" rtl="0" eaLnBrk="1" latinLnBrk="0" hangingPunct="1">
+              <a:lnSpc>
+                <a:spcPct val="100000"/>
+              </a:lnSpc>
+              <a:spcBef>
+                <a:spcPts val="0"/>
+              </a:spcBef>
+              <a:spcAft>
+                <a:spcPts val="600"/>
+              </a:spcAft>
+              <a:buSzPct val="100000"/>
+              <a:buFont typeface="Arial" panose="020B0604020202020204" pitchFamily="34" charset="0"/>
+              <a:buChar char="–"/>
+              <a:defRPr sz="1600" kern="1200">
+                <a:solidFill>
+                  <a:schemeClr val="tx1"/>
+                </a:solidFill>
+                <a:latin typeface="+mn-lt"/>
+                <a:ea typeface="+mn-ea"/>
+                <a:cs typeface="+mn-cs"/>
+              </a:defRPr>
+            </a:lvl4pPr>
+            <a:lvl5pPr marL="1060704" indent="-219456" algn="l" defTabSz="914400" rtl="0" eaLnBrk="1" latinLnBrk="0" hangingPunct="1">
+              <a:lnSpc>
+                <a:spcPct val="100000"/>
+              </a:lnSpc>
+              <a:spcBef>
+                <a:spcPts val="0"/>
+              </a:spcBef>
+              <a:spcAft>
+                <a:spcPts val="600"/>
+              </a:spcAft>
+              <a:buClr>
+                <a:schemeClr val="tx2"/>
+              </a:buClr>
+              <a:buSzPct val="75000"/>
+              <a:buFont typeface="Arial" panose="020B0604020202020204" pitchFamily="34" charset="0"/>
+              <a:buChar char="•"/>
+              <a:defRPr sz="1600" kern="1200">
+                <a:solidFill>
+                  <a:schemeClr val="tx1"/>
+                </a:solidFill>
+                <a:latin typeface="+mn-lt"/>
+                <a:ea typeface="+mn-ea"/>
+                <a:cs typeface="+mn-cs"/>
+              </a:defRPr>
+            </a:lvl5pPr>
+            <a:lvl6pPr marL="2514600" indent="-228600" algn="l" defTabSz="914400" rtl="0" eaLnBrk="1" latinLnBrk="0" hangingPunct="1">
+              <a:lnSpc>
+                <a:spcPct val="90000"/>
+              </a:lnSpc>
+              <a:spcBef>
+                <a:spcPts val="500"/>
+              </a:spcBef>
+              <a:buFont typeface="Arial" panose="020B0604020202020204" pitchFamily="34" charset="0"/>
+              <a:buChar char="•"/>
+              <a:defRPr sz="1800" kern="1200">
+                <a:solidFill>
+                  <a:schemeClr val="tx1"/>
+                </a:solidFill>
+                <a:latin typeface="+mn-lt"/>
+                <a:ea typeface="+mn-ea"/>
+                <a:cs typeface="+mn-cs"/>
+              </a:defRPr>
+            </a:lvl6pPr>
+            <a:lvl7pPr marL="2971800" indent="-228600" algn="l" defTabSz="914400" rtl="0" eaLnBrk="1" latinLnBrk="0" hangingPunct="1">
+              <a:lnSpc>
+                <a:spcPct val="90000"/>
+              </a:lnSpc>
+              <a:spcBef>
+                <a:spcPts val="500"/>
+              </a:spcBef>
+              <a:buFont typeface="Arial" panose="020B0604020202020204" pitchFamily="34" charset="0"/>
+              <a:buChar char="•"/>
+              <a:defRPr sz="1800" kern="1200">
+                <a:solidFill>
+                  <a:schemeClr val="tx1"/>
+                </a:solidFill>
+                <a:latin typeface="+mn-lt"/>
+                <a:ea typeface="+mn-ea"/>
+                <a:cs typeface="+mn-cs"/>
+              </a:defRPr>
+            </a:lvl7pPr>
+            <a:lvl8pPr marL="3429000" indent="-228600" algn="l" defTabSz="914400" rtl="0" eaLnBrk="1" latinLnBrk="0" hangingPunct="1">
+              <a:lnSpc>
+                <a:spcPct val="90000"/>
+              </a:lnSpc>
+              <a:spcBef>
+                <a:spcPts val="500"/>
+              </a:spcBef>
+              <a:buFont typeface="Arial" panose="020B0604020202020204" pitchFamily="34" charset="0"/>
+              <a:buChar char="•"/>
+              <a:defRPr sz="1800" kern="1200">
+                <a:solidFill>
+                  <a:schemeClr val="tx1"/>
+                </a:solidFill>
+                <a:latin typeface="+mn-lt"/>
+                <a:ea typeface="+mn-ea"/>
+                <a:cs typeface="+mn-cs"/>
+              </a:defRPr>
+            </a:lvl8pPr>
+            <a:lvl9pPr marL="3886200" indent="-228600" algn="l" defTabSz="914400" rtl="0" eaLnBrk="1" latinLnBrk="0" hangingPunct="1">
+              <a:lnSpc>
+                <a:spcPct val="90000"/>
+              </a:lnSpc>
+              <a:spcBef>
+                <a:spcPts val="500"/>
+              </a:spcBef>
+              <a:buFont typeface="Arial" panose="020B0604020202020204" pitchFamily="34" charset="0"/>
+              <a:buChar char="•"/>
+              <a:defRPr sz="1800" kern="1200">
+                <a:solidFill>
+                  <a:schemeClr val="tx1"/>
+                </a:solidFill>
+                <a:latin typeface="+mn-lt"/>
+                <a:ea typeface="+mn-ea"/>
+                <a:cs typeface="+mn-cs"/>
+              </a:defRPr>
+            </a:lvl9pPr>
+          </a:lstStyle>
+          <a:p>
+            <a:r>
+              <a:rPr lang="en-US" sz="2400" dirty="0"/>
+              <a:t>Git the tutorial:</a:t>
+            </a:r>
+          </a:p>
+          <a:p>
+            <a:endParaRPr lang="en-US" sz="2400" dirty="0"/>
+          </a:p>
+          <a:p>
+            <a:endParaRPr lang="en-US" sz="2400" dirty="0"/>
+          </a:p>
+          <a:p>
+            <a:r>
+              <a:rPr lang="en-US" sz="2400" dirty="0"/>
+              <a:t>[Optional] Launch a virtual environment</a:t>
+            </a:r>
+          </a:p>
+          <a:p>
+            <a:endParaRPr lang="en-US" sz="2400" dirty="0"/>
+          </a:p>
+          <a:p>
+            <a:endParaRPr lang="en-US" sz="2400" dirty="0"/>
+          </a:p>
+          <a:p>
+            <a:r>
+              <a:rPr lang="en-US" sz="2400" dirty="0"/>
+              <a:t>Install dependencies (sbol3 and </a:t>
+            </a:r>
+            <a:r>
+              <a:rPr lang="en-US" sz="2400" dirty="0" err="1"/>
+              <a:t>tyto</a:t>
+            </a:r>
+            <a:r>
+              <a:rPr lang="en-US" sz="2400" dirty="0"/>
+              <a:t>)</a:t>
+            </a:r>
+          </a:p>
+          <a:p>
+            <a:endParaRPr lang="en-US" sz="2400" dirty="0"/>
+          </a:p>
+          <a:p>
+            <a:pPr marL="0" indent="0">
+              <a:buNone/>
+            </a:pPr>
+            <a:endParaRPr lang="en-US" sz="2400" dirty="0"/>
+          </a:p>
+          <a:p>
+            <a:r>
+              <a:rPr lang="en-US" sz="2400" dirty="0"/>
+              <a:t>Run notebook</a:t>
+            </a:r>
+          </a:p>
+          <a:p>
+            <a:endParaRPr lang="en-US" dirty="0"/>
+          </a:p>
+          <a:p>
+            <a:endParaRPr lang="en-US" dirty="0"/>
+          </a:p>
+          <a:p>
+            <a:endParaRPr lang="en-US" dirty="0"/>
+          </a:p>
+        </p:txBody>
+      </p:sp>
+      <p:sp>
+        <p:nvSpPr>
+          <p:cNvPr id="6" name="TextBox 5">
+            <a:extLst>
+              <a:ext uri="{FF2B5EF4-FFF2-40B4-BE49-F238E27FC236}">
+                <a16:creationId xmlns:a16="http://schemas.microsoft.com/office/drawing/2014/main" id="{90205A3A-A1D3-6140-B765-309D7895684E}"/>
+              </a:ext>
+            </a:extLst>
+          </p:cNvPr>
+          <p:cNvSpPr txBox="1"/>
+          <p:nvPr/>
+        </p:nvSpPr>
+        <p:spPr>
+          <a:xfrm>
+            <a:off x="768269" y="1460574"/>
+            <a:ext cx="10876695" cy="830997"/>
+          </a:xfrm>
+          <a:prstGeom prst="rect">
+            <a:avLst/>
+          </a:prstGeom>
+          <a:solidFill>
+            <a:schemeClr val="bg1"/>
+          </a:solidFill>
+          <a:ln>
+            <a:solidFill>
+              <a:schemeClr val="tx1"/>
+            </a:solidFill>
+          </a:ln>
+          <a:effectLst>
+            <a:outerShdw blurRad="50800" dist="38100" dir="2700000" algn="tl" rotWithShape="0">
+              <a:prstClr val="black">
+                <a:alpha val="40000"/>
+              </a:prstClr>
+            </a:outerShdw>
+          </a:effectLst>
+        </p:spPr>
+        <p:txBody>
+          <a:bodyPr wrap="none" rtlCol="0">
+            <a:spAutoFit/>
+          </a:bodyPr>
+          <a:lstStyle/>
+          <a:p>
+            <a:r>
+              <a:rPr lang="en-US" sz="2400" dirty="0">
+                <a:latin typeface="Monaco" pitchFamily="2" charset="77"/>
+              </a:rPr>
+              <a:t>git clone https://</a:t>
+            </a:r>
+            <a:r>
+              <a:rPr lang="en-US" sz="2400" dirty="0" err="1">
+                <a:latin typeface="Monaco" pitchFamily="2" charset="77"/>
+              </a:rPr>
+              <a:t>github.com</a:t>
+            </a:r>
+            <a:r>
+              <a:rPr lang="en-US" sz="2400" dirty="0">
+                <a:latin typeface="Monaco" pitchFamily="2" charset="77"/>
+              </a:rPr>
+              <a:t>/</a:t>
+            </a:r>
+            <a:r>
+              <a:rPr lang="en-US" sz="2400" dirty="0" err="1">
+                <a:latin typeface="Monaco" pitchFamily="2" charset="77"/>
+              </a:rPr>
+              <a:t>SynBioDex</a:t>
+            </a:r>
+            <a:r>
+              <a:rPr lang="en-US" sz="2400" dirty="0">
+                <a:latin typeface="Monaco" pitchFamily="2" charset="77"/>
+              </a:rPr>
+              <a:t>/Community-</a:t>
+            </a:r>
+            <a:r>
+              <a:rPr lang="en-US" sz="2400" dirty="0" err="1">
+                <a:latin typeface="Monaco" pitchFamily="2" charset="77"/>
+              </a:rPr>
+              <a:t>Media.git</a:t>
+            </a:r>
+            <a:endParaRPr lang="en-US" sz="2400" dirty="0">
+              <a:latin typeface="Monaco" pitchFamily="2" charset="77"/>
+            </a:endParaRPr>
+          </a:p>
+          <a:p>
+            <a:r>
+              <a:rPr lang="en-US" sz="2400" dirty="0">
+                <a:latin typeface="Monaco" pitchFamily="2" charset="77"/>
+              </a:rPr>
+              <a:t>cd community-media/2021/IWBDA21</a:t>
+            </a:r>
+          </a:p>
+        </p:txBody>
+      </p:sp>
+      <p:sp>
+        <p:nvSpPr>
+          <p:cNvPr id="7" name="TextBox 6">
+            <a:extLst>
+              <a:ext uri="{FF2B5EF4-FFF2-40B4-BE49-F238E27FC236}">
+                <a16:creationId xmlns:a16="http://schemas.microsoft.com/office/drawing/2014/main" id="{1AB79211-C313-D249-A4C1-E5F09F8C5414}"/>
+              </a:ext>
+            </a:extLst>
+          </p:cNvPr>
+          <p:cNvSpPr txBox="1"/>
+          <p:nvPr/>
+        </p:nvSpPr>
+        <p:spPr>
+          <a:xfrm>
+            <a:off x="768269" y="2807723"/>
+            <a:ext cx="4793300" cy="830997"/>
+          </a:xfrm>
+          <a:prstGeom prst="rect">
+            <a:avLst/>
+          </a:prstGeom>
+          <a:solidFill>
+            <a:schemeClr val="bg1"/>
+          </a:solidFill>
+          <a:ln>
+            <a:solidFill>
+              <a:schemeClr val="tx1"/>
+            </a:solidFill>
+          </a:ln>
+          <a:effectLst>
+            <a:outerShdw blurRad="50800" dist="38100" dir="2700000" algn="tl" rotWithShape="0">
+              <a:prstClr val="black">
+                <a:alpha val="40000"/>
+              </a:prstClr>
+            </a:outerShdw>
+          </a:effectLst>
+        </p:spPr>
+        <p:txBody>
+          <a:bodyPr wrap="none" rtlCol="0">
+            <a:spAutoFit/>
+          </a:bodyPr>
+          <a:lstStyle/>
+          <a:p>
+            <a:r>
+              <a:rPr lang="en-US" sz="2400" dirty="0">
+                <a:latin typeface="Monaco" pitchFamily="2" charset="77"/>
+              </a:rPr>
+              <a:t>python –m </a:t>
+            </a:r>
+            <a:r>
+              <a:rPr lang="en-US" sz="2400" dirty="0" err="1">
+                <a:latin typeface="Monaco" pitchFamily="2" charset="77"/>
+              </a:rPr>
+              <a:t>venv</a:t>
+            </a:r>
+            <a:r>
+              <a:rPr lang="en-US" sz="2400" dirty="0">
+                <a:latin typeface="Monaco" pitchFamily="2" charset="77"/>
+              </a:rPr>
+              <a:t> </a:t>
+            </a:r>
+            <a:r>
+              <a:rPr lang="en-US" sz="2400" dirty="0" err="1">
+                <a:latin typeface="Monaco" pitchFamily="2" charset="77"/>
+              </a:rPr>
+              <a:t>iwbda</a:t>
+            </a:r>
+            <a:endParaRPr lang="en-US" sz="2400" dirty="0">
+              <a:latin typeface="Monaco" pitchFamily="2" charset="77"/>
+            </a:endParaRPr>
+          </a:p>
+          <a:p>
+            <a:r>
+              <a:rPr lang="en-US" sz="2400" dirty="0">
+                <a:latin typeface="Monaco" pitchFamily="2" charset="77"/>
+              </a:rPr>
+              <a:t>source </a:t>
+            </a:r>
+            <a:r>
+              <a:rPr lang="en-US" sz="2400" dirty="0" err="1">
+                <a:latin typeface="Monaco" pitchFamily="2" charset="77"/>
+              </a:rPr>
+              <a:t>iwbda</a:t>
+            </a:r>
+            <a:r>
+              <a:rPr lang="en-US" sz="2400" dirty="0">
+                <a:latin typeface="Monaco" pitchFamily="2" charset="77"/>
+              </a:rPr>
+              <a:t>/bin/activate</a:t>
+            </a:r>
+          </a:p>
+        </p:txBody>
+      </p:sp>
+      <p:sp>
+        <p:nvSpPr>
+          <p:cNvPr id="8" name="TextBox 7">
+            <a:extLst>
+              <a:ext uri="{FF2B5EF4-FFF2-40B4-BE49-F238E27FC236}">
+                <a16:creationId xmlns:a16="http://schemas.microsoft.com/office/drawing/2014/main" id="{45104C69-620A-2B4A-855B-32DCFF3842E8}"/>
+              </a:ext>
+            </a:extLst>
+          </p:cNvPr>
+          <p:cNvSpPr txBox="1"/>
+          <p:nvPr/>
+        </p:nvSpPr>
+        <p:spPr>
+          <a:xfrm>
+            <a:off x="768269" y="4127058"/>
+            <a:ext cx="5899372" cy="461665"/>
+          </a:xfrm>
+          <a:prstGeom prst="rect">
+            <a:avLst/>
+          </a:prstGeom>
+          <a:solidFill>
+            <a:schemeClr val="bg1"/>
+          </a:solidFill>
+          <a:ln>
+            <a:solidFill>
+              <a:schemeClr val="tx1"/>
+            </a:solidFill>
+          </a:ln>
+          <a:effectLst>
+            <a:outerShdw blurRad="50800" dist="38100" dir="2700000" algn="tl" rotWithShape="0">
+              <a:prstClr val="black">
+                <a:alpha val="40000"/>
+              </a:prstClr>
+            </a:outerShdw>
+          </a:effectLst>
+        </p:spPr>
+        <p:txBody>
+          <a:bodyPr wrap="none" rtlCol="0">
+            <a:spAutoFit/>
+          </a:bodyPr>
+          <a:lstStyle/>
+          <a:p>
+            <a:r>
+              <a:rPr lang="en-US" sz="2400" dirty="0">
+                <a:latin typeface="Monaco" pitchFamily="2" charset="77"/>
+              </a:rPr>
+              <a:t>pip install -r </a:t>
+            </a:r>
+            <a:r>
+              <a:rPr lang="en-US" sz="2400" dirty="0" err="1">
+                <a:latin typeface="Monaco" pitchFamily="2" charset="77"/>
+              </a:rPr>
+              <a:t>requirements.txt</a:t>
+            </a:r>
+            <a:endParaRPr lang="en-US" sz="2400" dirty="0">
+              <a:latin typeface="Monaco" pitchFamily="2" charset="77"/>
+            </a:endParaRPr>
+          </a:p>
+        </p:txBody>
+      </p:sp>
+      <p:sp>
+        <p:nvSpPr>
+          <p:cNvPr id="9" name="TextBox 8">
+            <a:extLst>
+              <a:ext uri="{FF2B5EF4-FFF2-40B4-BE49-F238E27FC236}">
+                <a16:creationId xmlns:a16="http://schemas.microsoft.com/office/drawing/2014/main" id="{F29D0D97-FF31-7E4D-9ECD-AA49DDB5F9BA}"/>
+              </a:ext>
+            </a:extLst>
+          </p:cNvPr>
+          <p:cNvSpPr txBox="1"/>
+          <p:nvPr/>
+        </p:nvSpPr>
+        <p:spPr>
+          <a:xfrm>
+            <a:off x="768269" y="5448208"/>
+            <a:ext cx="5899372" cy="461665"/>
+          </a:xfrm>
+          <a:prstGeom prst="rect">
+            <a:avLst/>
+          </a:prstGeom>
+          <a:solidFill>
+            <a:schemeClr val="bg1"/>
+          </a:solidFill>
+          <a:ln>
+            <a:solidFill>
+              <a:schemeClr val="tx1"/>
+            </a:solidFill>
+          </a:ln>
+          <a:effectLst>
+            <a:outerShdw blurRad="50800" dist="38100" dir="2700000" algn="tl" rotWithShape="0">
+              <a:prstClr val="black">
+                <a:alpha val="40000"/>
+              </a:prstClr>
+            </a:outerShdw>
+          </a:effectLst>
+        </p:spPr>
+        <p:txBody>
+          <a:bodyPr wrap="none" rtlCol="0">
+            <a:spAutoFit/>
+          </a:bodyPr>
+          <a:lstStyle/>
+          <a:p>
+            <a:r>
+              <a:rPr lang="en-US" sz="2400" dirty="0" err="1">
+                <a:latin typeface="Monaco" pitchFamily="2" charset="77"/>
+              </a:rPr>
+              <a:t>jupyter</a:t>
+            </a:r>
+            <a:r>
+              <a:rPr lang="en-US" sz="2400" dirty="0">
+                <a:latin typeface="Monaco" pitchFamily="2" charset="77"/>
+              </a:rPr>
+              <a:t> notebook </a:t>
+            </a:r>
+            <a:r>
+              <a:rPr lang="en-US" sz="2400" dirty="0" err="1">
+                <a:latin typeface="Monaco" pitchFamily="2" charset="77"/>
+              </a:rPr>
+              <a:t>tutorial.ipynb</a:t>
+            </a:r>
+            <a:endParaRPr lang="en-US" sz="2400" dirty="0">
+              <a:latin typeface="Monaco" pitchFamily="2" charset="77"/>
+            </a:endParaRPr>
+          </a:p>
+        </p:txBody>
+      </p:sp>
+    </p:spTree>
+    <p:extLst>
+      <p:ext uri="{BB962C8B-B14F-4D97-AF65-F5344CB8AC3E}">
+        <p14:creationId xmlns:p14="http://schemas.microsoft.com/office/powerpoint/2010/main" val="1092555644"/>
+      </p:ext>
+    </p:extLst>
+  </p:cSld>
+  <p:clrMapOvr>
+    <a:masterClrMapping/>
+  </p:clrMapOvr>
+  <mc:AlternateContent xmlns:mc="http://schemas.openxmlformats.org/markup-compatibility/2006" xmlns:p14="http://schemas.microsoft.com/office/powerpoint/2010/main">
+    <mc:Choice Requires="p14">
+      <p:transition spd="med" p14:dur="700">
+        <p:fade/>
+      </p:transition>
+    </mc:Choice>
+    <mc:Fallback xmlns="">
+      <p:transition spd="med">
+        <p:fade/>
+      </p:transition>
+    </mc:Fallback>
+  </mc:AlternateContent>
+</p:sld>
+</file>
+
 <file path=ppt/slides/slide2.xml><?xml version="1.0" encoding="utf-8"?>
 <p:sld xmlns:a="http://schemas.openxmlformats.org/drawingml/2006/main" xmlns:r="http://schemas.openxmlformats.org/officeDocument/2006/relationships" xmlns:p="http://schemas.openxmlformats.org/presentationml/2006/main">
   <p:cSld>
@@ -20962,13 +21660,13 @@
   <p:clrMapOvr>
     <a:masterClrMapping/>
   </p:clrMapOvr>
-  <mc:AlternateContent xmlns:mc="http://schemas.openxmlformats.org/markup-compatibility/2006">
-    <mc:Choice xmlns:p14="http://schemas.microsoft.com/office/powerpoint/2010/main" Requires="p14">
+  <mc:AlternateContent xmlns:mc="http://schemas.openxmlformats.org/markup-compatibility/2006" xmlns:p14="http://schemas.microsoft.com/office/powerpoint/2010/main">
+    <mc:Choice Requires="p14">
       <p:transition spd="med" p14:dur="700">
         <p:fade/>
       </p:transition>
     </mc:Choice>
-    <mc:Fallback>
+    <mc:Fallback xmlns="">
       <p:transition spd="med">
         <p:fade/>
       </p:transition>
@@ -22320,13 +23018,13 @@
   <p:clrMapOvr>
     <a:masterClrMapping/>
   </p:clrMapOvr>
-  <mc:AlternateContent xmlns:mc="http://schemas.openxmlformats.org/markup-compatibility/2006">
-    <mc:Choice xmlns:p14="http://schemas.microsoft.com/office/powerpoint/2010/main" Requires="p14">
+  <mc:AlternateContent xmlns:mc="http://schemas.openxmlformats.org/markup-compatibility/2006" xmlns:p14="http://schemas.microsoft.com/office/powerpoint/2010/main">
+    <mc:Choice Requires="p14">
       <p:transition spd="med" p14:dur="700">
         <p:fade/>
       </p:transition>
     </mc:Choice>
-    <mc:Fallback>
+    <mc:Fallback xmlns="">
       <p:transition spd="med">
         <p:fade/>
       </p:transition>
@@ -23548,19 +24246,19 @@
 </file>
 
 <file path=customXml/itemProps1.xml><?xml version="1.0" encoding="utf-8"?>
+<ds:datastoreItem xmlns:ds="http://schemas.openxmlformats.org/officeDocument/2006/customXml" ds:itemID="{D88A9972-54D5-4A46-9260-9FE1CB78EDF2}">
+  <ds:schemaRefs>
+    <ds:schemaRef ds:uri="http://www.w3.org/2001/XMLSchema"/>
+    <ds:schemaRef ds:uri="http://www.boldonjames.com/2008/01/sie/internal/label"/>
+  </ds:schemaRefs>
+</ds:datastoreItem>
+</file>
+
+<file path=customXml/itemProps2.xml><?xml version="1.0" encoding="utf-8"?>
 <ds:datastoreItem xmlns:ds="http://schemas.openxmlformats.org/officeDocument/2006/customXml" ds:itemID="{26C53044-EDCC-4767-9B64-ABCDF4BF539A}">
   <ds:schemaRefs>
     <ds:schemaRef ds:uri="http://www.w3.org/2001/XMLSchema"/>
     <ds:schemaRef ds:uri="http://www.boldonjames.com/2016/02/Classifier/internal/wrappedLabelHistory"/>
   </ds:schemaRefs>
 </ds:datastoreItem>
-</file>
-
-<file path=customXml/itemProps2.xml><?xml version="1.0" encoding="utf-8"?>
-<ds:datastoreItem xmlns:ds="http://schemas.openxmlformats.org/officeDocument/2006/customXml" ds:itemID="{D88A9972-54D5-4A46-9260-9FE1CB78EDF2}">
-  <ds:schemaRefs>
-    <ds:schemaRef ds:uri="http://www.w3.org/2001/XMLSchema"/>
-    <ds:schemaRef ds:uri="http://www.boldonjames.com/2008/01/sie/internal/label"/>
-  </ds:schemaRefs>
-</ds:datastoreItem>
 </file>
</xml_diff>

<commit_message>
Correct the workshop end time
</commit_message>
<xml_diff>
--- a/2021/IWBDA21/pySBOL3-IWBDA-2021.pptx
+++ b/2021/IWBDA21/pySBOL3-IWBDA-2021.pptx
@@ -9306,14 +9306,14 @@
           </a:ln>
           <a:extLst>
             <a:ext uri="{909E8E84-426E-40dd-AFC4-6F175D3DCCD1}">
-              <a14:hiddenFill xmlns:a14="http://schemas.microsoft.com/office/drawing/2010/main" xmlns="">
+              <a14:hiddenFill xmlns="" xmlns:a14="http://schemas.microsoft.com/office/drawing/2010/main">
                 <a:solidFill>
                   <a:srgbClr val="FFFFFF"/>
                 </a:solidFill>
               </a14:hiddenFill>
             </a:ext>
             <a:ext uri="{91240B29-F687-4f45-9708-019B960494DF}">
-              <a14:hiddenLine xmlns:a14="http://schemas.microsoft.com/office/drawing/2010/main" xmlns="" w="9525">
+              <a14:hiddenLine xmlns="" xmlns:a14="http://schemas.microsoft.com/office/drawing/2010/main" w="9525">
                 <a:solidFill>
                   <a:srgbClr val="000000"/>
                 </a:solidFill>
@@ -9571,14 +9571,14 @@
           </a:ln>
           <a:extLst>
             <a:ext uri="{909E8E84-426E-40dd-AFC4-6F175D3DCCD1}">
-              <a14:hiddenFill xmlns:a14="http://schemas.microsoft.com/office/drawing/2010/main" xmlns="">
+              <a14:hiddenFill xmlns="" xmlns:a14="http://schemas.microsoft.com/office/drawing/2010/main">
                 <a:solidFill>
                   <a:srgbClr val="FFFFFF"/>
                 </a:solidFill>
               </a14:hiddenFill>
             </a:ext>
             <a:ext uri="{91240B29-F687-4f45-9708-019B960494DF}">
-              <a14:hiddenLine xmlns:a14="http://schemas.microsoft.com/office/drawing/2010/main" xmlns="" w="9525">
+              <a14:hiddenLine xmlns="" xmlns:a14="http://schemas.microsoft.com/office/drawing/2010/main" w="9525">
                 <a:solidFill>
                   <a:srgbClr val="000000"/>
                 </a:solidFill>
@@ -15867,7 +15867,7 @@
             <a:pPr algn="ctr"/>
             <a:r>
               <a:rPr lang="en-US" dirty="0"/>
-              <a:t>17:30 - 15:30 UTC</a:t>
+              <a:t>17:30 - 19:30 UTC</a:t>
             </a:r>
           </a:p>
           <a:p>
@@ -24246,19 +24246,19 @@
 </file>
 
 <file path=customXml/itemProps1.xml><?xml version="1.0" encoding="utf-8"?>
+<ds:datastoreItem xmlns:ds="http://schemas.openxmlformats.org/officeDocument/2006/customXml" ds:itemID="{26C53044-EDCC-4767-9B64-ABCDF4BF539A}">
+  <ds:schemaRefs>
+    <ds:schemaRef ds:uri="http://www.w3.org/2001/XMLSchema"/>
+    <ds:schemaRef ds:uri="http://www.boldonjames.com/2016/02/Classifier/internal/wrappedLabelHistory"/>
+  </ds:schemaRefs>
+</ds:datastoreItem>
+</file>
+
+<file path=customXml/itemProps2.xml><?xml version="1.0" encoding="utf-8"?>
 <ds:datastoreItem xmlns:ds="http://schemas.openxmlformats.org/officeDocument/2006/customXml" ds:itemID="{D88A9972-54D5-4A46-9260-9FE1CB78EDF2}">
   <ds:schemaRefs>
     <ds:schemaRef ds:uri="http://www.w3.org/2001/XMLSchema"/>
     <ds:schemaRef ds:uri="http://www.boldonjames.com/2008/01/sie/internal/label"/>
   </ds:schemaRefs>
 </ds:datastoreItem>
-</file>
-
-<file path=customXml/itemProps2.xml><?xml version="1.0" encoding="utf-8"?>
-<ds:datastoreItem xmlns:ds="http://schemas.openxmlformats.org/officeDocument/2006/customXml" ds:itemID="{26C53044-EDCC-4767-9B64-ABCDF4BF539A}">
-  <ds:schemaRefs>
-    <ds:schemaRef ds:uri="http://www.w3.org/2001/XMLSchema"/>
-    <ds:schemaRef ds:uri="http://www.boldonjames.com/2016/02/Classifier/internal/wrappedLabelHistory"/>
-  </ds:schemaRefs>
-</ds:datastoreItem>
 </file>
</xml_diff>